<commit_message>
Angular momentum chapter done
</commit_message>
<xml_diff>
--- a/tex/figures/AngularMomentumRolling/Figures.pptx
+++ b/tex/figures/AngularMomentumRolling/Figures.pptx
@@ -247,7 +247,7 @@
           <a:p>
             <a:fld id="{F7249F8D-641B-4CAF-BAE5-10524742F6F1}" type="datetimeFigureOut">
               <a:rPr lang="en-CA" smtClean="0"/>
-              <a:t>2018-07-11</a:t>
+              <a:t>2018-07-12</a:t>
             </a:fld>
             <a:endParaRPr lang="en-CA"/>
           </a:p>
@@ -417,7 +417,7 @@
           <a:p>
             <a:fld id="{F7249F8D-641B-4CAF-BAE5-10524742F6F1}" type="datetimeFigureOut">
               <a:rPr lang="en-CA" smtClean="0"/>
-              <a:t>2018-07-11</a:t>
+              <a:t>2018-07-12</a:t>
             </a:fld>
             <a:endParaRPr lang="en-CA"/>
           </a:p>
@@ -597,7 +597,7 @@
           <a:p>
             <a:fld id="{F7249F8D-641B-4CAF-BAE5-10524742F6F1}" type="datetimeFigureOut">
               <a:rPr lang="en-CA" smtClean="0"/>
-              <a:t>2018-07-11</a:t>
+              <a:t>2018-07-12</a:t>
             </a:fld>
             <a:endParaRPr lang="en-CA"/>
           </a:p>
@@ -767,7 +767,7 @@
           <a:p>
             <a:fld id="{F7249F8D-641B-4CAF-BAE5-10524742F6F1}" type="datetimeFigureOut">
               <a:rPr lang="en-CA" smtClean="0"/>
-              <a:t>2018-07-11</a:t>
+              <a:t>2018-07-12</a:t>
             </a:fld>
             <a:endParaRPr lang="en-CA"/>
           </a:p>
@@ -1013,7 +1013,7 @@
           <a:p>
             <a:fld id="{F7249F8D-641B-4CAF-BAE5-10524742F6F1}" type="datetimeFigureOut">
               <a:rPr lang="en-CA" smtClean="0"/>
-              <a:t>2018-07-11</a:t>
+              <a:t>2018-07-12</a:t>
             </a:fld>
             <a:endParaRPr lang="en-CA"/>
           </a:p>
@@ -1245,7 +1245,7 @@
           <a:p>
             <a:fld id="{F7249F8D-641B-4CAF-BAE5-10524742F6F1}" type="datetimeFigureOut">
               <a:rPr lang="en-CA" smtClean="0"/>
-              <a:t>2018-07-11</a:t>
+              <a:t>2018-07-12</a:t>
             </a:fld>
             <a:endParaRPr lang="en-CA"/>
           </a:p>
@@ -1612,7 +1612,7 @@
           <a:p>
             <a:fld id="{F7249F8D-641B-4CAF-BAE5-10524742F6F1}" type="datetimeFigureOut">
               <a:rPr lang="en-CA" smtClean="0"/>
-              <a:t>2018-07-11</a:t>
+              <a:t>2018-07-12</a:t>
             </a:fld>
             <a:endParaRPr lang="en-CA"/>
           </a:p>
@@ -1730,7 +1730,7 @@
           <a:p>
             <a:fld id="{F7249F8D-641B-4CAF-BAE5-10524742F6F1}" type="datetimeFigureOut">
               <a:rPr lang="en-CA" smtClean="0"/>
-              <a:t>2018-07-11</a:t>
+              <a:t>2018-07-12</a:t>
             </a:fld>
             <a:endParaRPr lang="en-CA"/>
           </a:p>
@@ -1825,7 +1825,7 @@
           <a:p>
             <a:fld id="{F7249F8D-641B-4CAF-BAE5-10524742F6F1}" type="datetimeFigureOut">
               <a:rPr lang="en-CA" smtClean="0"/>
-              <a:t>2018-07-11</a:t>
+              <a:t>2018-07-12</a:t>
             </a:fld>
             <a:endParaRPr lang="en-CA"/>
           </a:p>
@@ -2102,7 +2102,7 @@
           <a:p>
             <a:fld id="{F7249F8D-641B-4CAF-BAE5-10524742F6F1}" type="datetimeFigureOut">
               <a:rPr lang="en-CA" smtClean="0"/>
-              <a:t>2018-07-11</a:t>
+              <a:t>2018-07-12</a:t>
             </a:fld>
             <a:endParaRPr lang="en-CA"/>
           </a:p>
@@ -2355,7 +2355,7 @@
           <a:p>
             <a:fld id="{F7249F8D-641B-4CAF-BAE5-10524742F6F1}" type="datetimeFigureOut">
               <a:rPr lang="en-CA" smtClean="0"/>
-              <a:t>2018-07-11</a:t>
+              <a:t>2018-07-12</a:t>
             </a:fld>
             <a:endParaRPr lang="en-CA"/>
           </a:p>
@@ -2568,7 +2568,7 @@
           <a:p>
             <a:fld id="{F7249F8D-641B-4CAF-BAE5-10524742F6F1}" type="datetimeFigureOut">
               <a:rPr lang="en-CA" smtClean="0"/>
-              <a:t>2018-07-11</a:t>
+              <a:t>2018-07-12</a:t>
             </a:fld>
             <a:endParaRPr lang="en-CA"/>
           </a:p>
@@ -5707,7 +5707,7 @@
               <p:spPr>
                 <a:xfrm>
                   <a:off x="6820566" y="1961243"/>
-                  <a:ext cx="246991" cy="307777"/>
+                  <a:ext cx="198003" cy="307777"/>
                 </a:xfrm>
                 <a:prstGeom prst="rect">
                   <a:avLst/>
@@ -5727,47 +5727,26 @@
                         <m:jc m:val="centerGroup"/>
                       </m:oMathParaPr>
                       <m:oMath xmlns:m="http://schemas.openxmlformats.org/officeDocument/2006/math">
-                        <m:sSub>
-                          <m:sSubPr>
+                        <m:acc>
+                          <m:accPr>
+                            <m:chr m:val="⃗"/>
                             <m:ctrlPr>
                               <a:rPr lang="en-US" sz="2000" b="0" i="1" smtClean="0">
                                 <a:latin typeface="Cambria Math" panose="02040503050406030204" pitchFamily="18" charset="0"/>
                                 <a:cs typeface="Arial" panose="020B0604020202020204" pitchFamily="34" charset="0"/>
                               </a:rPr>
                             </m:ctrlPr>
-                          </m:sSubPr>
+                          </m:accPr>
                           <m:e>
-                            <m:acc>
-                              <m:accPr>
-                                <m:chr m:val="⃗"/>
-                                <m:ctrlPr>
-                                  <a:rPr lang="en-US" sz="2000" b="0" i="1" smtClean="0">
-                                    <a:latin typeface="Cambria Math" panose="02040503050406030204" pitchFamily="18" charset="0"/>
-                                    <a:cs typeface="Arial" panose="020B0604020202020204" pitchFamily="34" charset="0"/>
-                                  </a:rPr>
-                                </m:ctrlPr>
-                              </m:accPr>
-                              <m:e>
-                                <m:r>
-                                  <a:rPr lang="en-US" sz="2000" b="0" i="1" smtClean="0">
-                                    <a:latin typeface="Cambria Math" panose="02040503050406030204" pitchFamily="18" charset="0"/>
-                                    <a:cs typeface="Arial" panose="020B0604020202020204" pitchFamily="34" charset="0"/>
-                                  </a:rPr>
-                                  <m:t>𝑟</m:t>
-                                </m:r>
-                              </m:e>
-                            </m:acc>
-                          </m:e>
-                          <m:sub>
                             <m:r>
                               <a:rPr lang="en-US" sz="2000" b="0" i="1" smtClean="0">
                                 <a:latin typeface="Cambria Math" panose="02040503050406030204" pitchFamily="18" charset="0"/>
                                 <a:cs typeface="Arial" panose="020B0604020202020204" pitchFamily="34" charset="0"/>
                               </a:rPr>
-                              <m:t>𝑖</m:t>
+                              <m:t>𝑟</m:t>
                             </m:r>
-                          </m:sub>
-                        </m:sSub>
+                          </m:e>
+                        </m:acc>
                       </m:oMath>
                     </m:oMathPara>
                   </a14:m>
@@ -5791,7 +5770,7 @@
               <p:spPr>
                 <a:xfrm>
                   <a:off x="6820566" y="1961243"/>
-                  <a:ext cx="246991" cy="307777"/>
+                  <a:ext cx="198003" cy="307777"/>
                 </a:xfrm>
                 <a:prstGeom prst="rect">
                   <a:avLst/>
@@ -5799,7 +5778,7 @@
                 <a:blipFill>
                   <a:blip r:embed="rId12"/>
                   <a:stretch>
-                    <a:fillRect l="-25000" t="-33333" r="-77500" b="-19608"/>
+                    <a:fillRect l="-27273" t="-36000" r="-93939" b="-6000"/>
                   </a:stretch>
                 </a:blipFill>
               </p:spPr>
@@ -6157,438 +6136,6 @@
             </p:sp>
           </mc:Fallback>
         </mc:AlternateContent>
-      </p:grpSp>
-      <p:grpSp>
-        <p:nvGrpSpPr>
-          <p:cNvPr id="40" name="Group 39"/>
-          <p:cNvGrpSpPr/>
-          <p:nvPr/>
-        </p:nvGrpSpPr>
-        <p:grpSpPr>
-          <a:xfrm>
-            <a:off x="1155624" y="3979003"/>
-            <a:ext cx="2738712" cy="2607131"/>
-            <a:chOff x="1155624" y="3979003"/>
-            <a:chExt cx="2738712" cy="2607131"/>
-          </a:xfrm>
-        </p:grpSpPr>
-        <p:grpSp>
-          <p:nvGrpSpPr>
-            <p:cNvPr id="13" name="Group 12"/>
-            <p:cNvGrpSpPr/>
-            <p:nvPr/>
-          </p:nvGrpSpPr>
-          <p:grpSpPr>
-            <a:xfrm>
-              <a:off x="1155624" y="4275977"/>
-              <a:ext cx="2310157" cy="2310157"/>
-              <a:chOff x="1155624" y="4275977"/>
-              <a:chExt cx="2310157" cy="2310157"/>
-            </a:xfrm>
-          </p:grpSpPr>
-          <p:sp>
-            <p:nvSpPr>
-              <p:cNvPr id="77" name="Oval 76"/>
-              <p:cNvSpPr/>
-              <p:nvPr/>
-            </p:nvSpPr>
-            <p:spPr>
-              <a:xfrm>
-                <a:off x="1155624" y="4275977"/>
-                <a:ext cx="2310157" cy="2310157"/>
-              </a:xfrm>
-              <a:prstGeom prst="ellipse">
-                <a:avLst/>
-              </a:prstGeom>
-              <a:noFill/>
-              <a:ln w="38100">
-                <a:solidFill>
-                  <a:schemeClr val="tx1"/>
-                </a:solidFill>
-                <a:prstDash val="dash"/>
-              </a:ln>
-            </p:spPr>
-            <p:style>
-              <a:lnRef idx="2">
-                <a:schemeClr val="accent1">
-                  <a:shade val="50000"/>
-                </a:schemeClr>
-              </a:lnRef>
-              <a:fillRef idx="1">
-                <a:schemeClr val="accent1"/>
-              </a:fillRef>
-              <a:effectRef idx="0">
-                <a:schemeClr val="accent1"/>
-              </a:effectRef>
-              <a:fontRef idx="minor">
-                <a:schemeClr val="lt1"/>
-              </a:fontRef>
-            </p:style>
-            <p:txBody>
-              <a:bodyPr rtlCol="0" anchor="ctr"/>
-              <a:lstStyle/>
-              <a:p>
-                <a:pPr algn="ctr"/>
-                <a:endParaRPr lang="en-US"/>
-              </a:p>
-            </p:txBody>
-          </p:sp>
-          <p:sp>
-            <p:nvSpPr>
-              <p:cNvPr id="78" name="Oval 77"/>
-              <p:cNvSpPr/>
-              <p:nvPr/>
-            </p:nvSpPr>
-            <p:spPr>
-              <a:xfrm>
-                <a:off x="2250230" y="5371172"/>
-                <a:ext cx="120943" cy="119766"/>
-              </a:xfrm>
-              <a:prstGeom prst="ellipse">
-                <a:avLst/>
-              </a:prstGeom>
-              <a:solidFill>
-                <a:schemeClr val="tx1"/>
-              </a:solidFill>
-              <a:ln w="38100">
-                <a:solidFill>
-                  <a:schemeClr val="tx1"/>
-                </a:solidFill>
-              </a:ln>
-            </p:spPr>
-            <p:style>
-              <a:lnRef idx="2">
-                <a:schemeClr val="accent1">
-                  <a:shade val="50000"/>
-                </a:schemeClr>
-              </a:lnRef>
-              <a:fillRef idx="1">
-                <a:schemeClr val="accent1"/>
-              </a:fillRef>
-              <a:effectRef idx="0">
-                <a:schemeClr val="accent1"/>
-              </a:effectRef>
-              <a:fontRef idx="minor">
-                <a:schemeClr val="lt1"/>
-              </a:fontRef>
-            </p:style>
-            <p:txBody>
-              <a:bodyPr rtlCol="0" anchor="ctr"/>
-              <a:lstStyle/>
-              <a:p>
-                <a:pPr algn="ctr"/>
-                <a:endParaRPr lang="en-US"/>
-              </a:p>
-            </p:txBody>
-          </p:sp>
-          <p:cxnSp>
-            <p:nvCxnSpPr>
-              <p:cNvPr id="3" name="Straight Connector 2"/>
-              <p:cNvCxnSpPr>
-                <a:stCxn id="78" idx="7"/>
-                <a:endCxn id="77" idx="7"/>
-              </p:cNvCxnSpPr>
-              <p:nvPr/>
-            </p:nvCxnSpPr>
-            <p:spPr>
-              <a:xfrm flipV="1">
-                <a:off x="2353461" y="4614292"/>
-                <a:ext cx="774005" cy="774419"/>
-              </a:xfrm>
-              <a:prstGeom prst="line">
-                <a:avLst/>
-              </a:prstGeom>
-              <a:ln w="38100">
-                <a:solidFill>
-                  <a:schemeClr val="tx1"/>
-                </a:solidFill>
-              </a:ln>
-            </p:spPr>
-            <p:style>
-              <a:lnRef idx="1">
-                <a:schemeClr val="accent1"/>
-              </a:lnRef>
-              <a:fillRef idx="0">
-                <a:schemeClr val="accent1"/>
-              </a:fillRef>
-              <a:effectRef idx="0">
-                <a:schemeClr val="accent1"/>
-              </a:effectRef>
-              <a:fontRef idx="minor">
-                <a:schemeClr val="tx1"/>
-              </a:fontRef>
-            </p:style>
-          </p:cxnSp>
-          <mc:AlternateContent xmlns:mc="http://schemas.openxmlformats.org/markup-compatibility/2006" xmlns:a14="http://schemas.microsoft.com/office/drawing/2010/main">
-            <mc:Choice Requires="a14">
-              <p:sp>
-                <p:nvSpPr>
-                  <p:cNvPr id="12" name="TextBox 11"/>
-                  <p:cNvSpPr txBox="1"/>
-                  <p:nvPr/>
-                </p:nvSpPr>
-                <p:spPr>
-                  <a:xfrm>
-                    <a:off x="2414177" y="4819026"/>
-                    <a:ext cx="241540" cy="307777"/>
-                  </a:xfrm>
-                  <a:prstGeom prst="rect">
-                    <a:avLst/>
-                  </a:prstGeom>
-                  <a:noFill/>
-                </p:spPr>
-                <p:txBody>
-                  <a:bodyPr wrap="none" lIns="0" tIns="0" rIns="0" bIns="0" rtlCol="0">
-                    <a:spAutoFit/>
-                  </a:bodyPr>
-                  <a:lstStyle/>
-                  <a:p>
-                    <a:pPr/>
-                    <a14:m>
-                      <m:oMathPara xmlns:m="http://schemas.openxmlformats.org/officeDocument/2006/math">
-                        <m:oMathParaPr>
-                          <m:jc m:val="centerGroup"/>
-                        </m:oMathParaPr>
-                        <m:oMath xmlns:m="http://schemas.openxmlformats.org/officeDocument/2006/math">
-                          <m:r>
-                            <a:rPr lang="en-US" sz="2000" b="0" i="1" smtClean="0">
-                              <a:latin typeface="Cambria Math" panose="02040503050406030204" pitchFamily="18" charset="0"/>
-                              <a:cs typeface="Arial" panose="020B0604020202020204" pitchFamily="34" charset="0"/>
-                            </a:rPr>
-                            <m:t>𝑅</m:t>
-                          </m:r>
-                        </m:oMath>
-                      </m:oMathPara>
-                    </a14:m>
-                    <a:endParaRPr lang="en-US" sz="2000" dirty="0" smtClean="0">
-                      <a:latin typeface="Arial" panose="020B0604020202020204" pitchFamily="34" charset="0"/>
-                      <a:cs typeface="Arial" panose="020B0604020202020204" pitchFamily="34" charset="0"/>
-                    </a:endParaRPr>
-                  </a:p>
-                </p:txBody>
-              </p:sp>
-            </mc:Choice>
-            <mc:Fallback xmlns="">
-              <p:sp>
-                <p:nvSpPr>
-                  <p:cNvPr id="12" name="TextBox 11"/>
-                  <p:cNvSpPr txBox="1">
-                    <a:spLocks noRot="1" noChangeAspect="1" noMove="1" noResize="1" noEditPoints="1" noAdjustHandles="1" noChangeArrowheads="1" noChangeShapeType="1" noTextEdit="1"/>
-                  </p:cNvSpPr>
-                  <p:nvPr/>
-                </p:nvSpPr>
-                <p:spPr>
-                  <a:xfrm>
-                    <a:off x="2414177" y="4819026"/>
-                    <a:ext cx="241540" cy="307777"/>
-                  </a:xfrm>
-                  <a:prstGeom prst="rect">
-                    <a:avLst/>
-                  </a:prstGeom>
-                  <a:blipFill>
-                    <a:blip r:embed="rId15"/>
-                    <a:stretch>
-                      <a:fillRect l="-20000" r="-20000" b="-10000"/>
-                    </a:stretch>
-                  </a:blipFill>
-                </p:spPr>
-                <p:txBody>
-                  <a:bodyPr/>
-                  <a:lstStyle/>
-                  <a:p>
-                    <a:r>
-                      <a:rPr lang="en-US">
-                        <a:noFill/>
-                      </a:rPr>
-                      <a:t> </a:t>
-                    </a:r>
-                  </a:p>
-                </p:txBody>
-              </p:sp>
-            </mc:Fallback>
-          </mc:AlternateContent>
-          <p:sp>
-            <p:nvSpPr>
-              <p:cNvPr id="79" name="Oval 78"/>
-              <p:cNvSpPr/>
-              <p:nvPr/>
-            </p:nvSpPr>
-            <p:spPr>
-              <a:xfrm>
-                <a:off x="3048806" y="4524231"/>
-                <a:ext cx="181891" cy="180121"/>
-              </a:xfrm>
-              <a:prstGeom prst="ellipse">
-                <a:avLst/>
-              </a:prstGeom>
-              <a:solidFill>
-                <a:schemeClr val="tx1"/>
-              </a:solidFill>
-              <a:ln w="38100">
-                <a:solidFill>
-                  <a:schemeClr val="tx1"/>
-                </a:solidFill>
-              </a:ln>
-            </p:spPr>
-            <p:style>
-              <a:lnRef idx="2">
-                <a:schemeClr val="accent1">
-                  <a:shade val="50000"/>
-                </a:schemeClr>
-              </a:lnRef>
-              <a:fillRef idx="1">
-                <a:schemeClr val="accent1"/>
-              </a:fillRef>
-              <a:effectRef idx="0">
-                <a:schemeClr val="accent1"/>
-              </a:effectRef>
-              <a:fontRef idx="minor">
-                <a:schemeClr val="lt1"/>
-              </a:fontRef>
-            </p:style>
-            <p:txBody>
-              <a:bodyPr rtlCol="0" anchor="ctr"/>
-              <a:lstStyle/>
-              <a:p>
-                <a:pPr algn="ctr"/>
-                <a:endParaRPr lang="en-US"/>
-              </a:p>
-            </p:txBody>
-          </p:sp>
-        </p:grpSp>
-        <mc:AlternateContent xmlns:mc="http://schemas.openxmlformats.org/markup-compatibility/2006" xmlns:a14="http://schemas.microsoft.com/office/drawing/2010/main">
-          <mc:Choice Requires="a14">
-            <p:sp>
-              <p:nvSpPr>
-                <p:cNvPr id="38" name="TextBox 37"/>
-                <p:cNvSpPr txBox="1"/>
-                <p:nvPr/>
-              </p:nvSpPr>
-              <p:spPr>
-                <a:xfrm flipH="1">
-                  <a:off x="3068273" y="4246216"/>
-                  <a:ext cx="496685" cy="307777"/>
-                </a:xfrm>
-                <a:prstGeom prst="rect">
-                  <a:avLst/>
-                </a:prstGeom>
-                <a:noFill/>
-              </p:spPr>
-              <p:txBody>
-                <a:bodyPr wrap="square" lIns="0" tIns="0" rIns="0" bIns="0" rtlCol="0">
-                  <a:spAutoFit/>
-                </a:bodyPr>
-                <a:lstStyle/>
-                <a:p>
-                  <a:pPr/>
-                  <a14:m>
-                    <m:oMathPara xmlns:m="http://schemas.openxmlformats.org/officeDocument/2006/math">
-                      <m:oMathParaPr>
-                        <m:jc m:val="centerGroup"/>
-                      </m:oMathParaPr>
-                      <m:oMath xmlns:m="http://schemas.openxmlformats.org/officeDocument/2006/math">
-                        <m:r>
-                          <a:rPr lang="en-US" sz="2000" b="0" i="1" smtClean="0">
-                            <a:latin typeface="Cambria Math" panose="02040503050406030204" pitchFamily="18" charset="0"/>
-                            <a:cs typeface="Arial" panose="020B0604020202020204" pitchFamily="34" charset="0"/>
-                          </a:rPr>
-                          <m:t>𝑚</m:t>
-                        </m:r>
-                      </m:oMath>
-                    </m:oMathPara>
-                  </a14:m>
-                  <a:endParaRPr lang="en-US" sz="2000" dirty="0" smtClean="0">
-                    <a:latin typeface="Arial" panose="020B0604020202020204" pitchFamily="34" charset="0"/>
-                    <a:cs typeface="Arial" panose="020B0604020202020204" pitchFamily="34" charset="0"/>
-                  </a:endParaRPr>
-                </a:p>
-              </p:txBody>
-            </p:sp>
-          </mc:Choice>
-          <mc:Fallback xmlns="">
-            <p:sp>
-              <p:nvSpPr>
-                <p:cNvPr id="38" name="TextBox 37"/>
-                <p:cNvSpPr txBox="1">
-                  <a:spLocks noRot="1" noChangeAspect="1" noMove="1" noResize="1" noEditPoints="1" noAdjustHandles="1" noChangeArrowheads="1" noChangeShapeType="1" noTextEdit="1"/>
-                </p:cNvSpPr>
-                <p:nvPr/>
-              </p:nvSpPr>
-              <p:spPr>
-                <a:xfrm flipH="1">
-                  <a:off x="3068273" y="4246216"/>
-                  <a:ext cx="496685" cy="307777"/>
-                </a:xfrm>
-                <a:prstGeom prst="rect">
-                  <a:avLst/>
-                </a:prstGeom>
-                <a:blipFill>
-                  <a:blip r:embed="rId16"/>
-                  <a:stretch>
-                    <a:fillRect b="-2000"/>
-                  </a:stretch>
-                </a:blipFill>
-              </p:spPr>
-              <p:txBody>
-                <a:bodyPr/>
-                <a:lstStyle/>
-                <a:p>
-                  <a:r>
-                    <a:rPr lang="en-US">
-                      <a:noFill/>
-                    </a:rPr>
-                    <a:t> </a:t>
-                  </a:r>
-                </a:p>
-              </p:txBody>
-            </p:sp>
-          </mc:Fallback>
-        </mc:AlternateContent>
-        <p:sp>
-          <p:nvSpPr>
-            <p:cNvPr id="39" name="Arc 38"/>
-            <p:cNvSpPr/>
-            <p:nvPr/>
-          </p:nvSpPr>
-          <p:spPr>
-            <a:xfrm>
-              <a:off x="1484599" y="3979003"/>
-              <a:ext cx="2409737" cy="2409737"/>
-            </a:xfrm>
-            <a:prstGeom prst="arc">
-              <a:avLst/>
-            </a:prstGeom>
-            <a:ln w="38100">
-              <a:solidFill>
-                <a:schemeClr val="tx1"/>
-              </a:solidFill>
-              <a:headEnd type="triangle" w="med" len="med"/>
-              <a:tailEnd type="none" w="med" len="med"/>
-            </a:ln>
-          </p:spPr>
-          <p:style>
-            <a:lnRef idx="1">
-              <a:schemeClr val="accent1"/>
-            </a:lnRef>
-            <a:fillRef idx="0">
-              <a:schemeClr val="accent1"/>
-            </a:fillRef>
-            <a:effectRef idx="0">
-              <a:schemeClr val="accent1"/>
-            </a:effectRef>
-            <a:fontRef idx="minor">
-              <a:schemeClr val="tx1"/>
-            </a:fontRef>
-          </p:style>
-          <p:txBody>
-            <a:bodyPr rtlCol="0" anchor="ctr"/>
-            <a:lstStyle/>
-            <a:p>
-              <a:pPr algn="ctr"/>
-              <a:endParaRPr lang="en-US"/>
-            </a:p>
-          </p:txBody>
-        </p:sp>
       </p:grpSp>
       <p:grpSp>
         <p:nvGrpSpPr>
@@ -9030,8 +8577,8 @@
             </a:p>
           </p:txBody>
         </p:sp>
-        <mc:AlternateContent xmlns:mc="http://schemas.openxmlformats.org/markup-compatibility/2006">
-          <mc:Choice xmlns:a14="http://schemas.microsoft.com/office/drawing/2010/main" Requires="a14">
+        <mc:AlternateContent xmlns:mc="http://schemas.openxmlformats.org/markup-compatibility/2006" xmlns:a14="http://schemas.microsoft.com/office/drawing/2010/main">
+          <mc:Choice Requires="a14">
             <p:sp>
               <p:nvSpPr>
                 <p:cNvPr id="2" name="TextBox 1"/>
@@ -9054,6 +8601,7 @@
                 </a:bodyPr>
                 <a:lstStyle/>
                 <a:p>
+                  <a:pPr/>
                   <a14:m>
                     <m:oMathPara xmlns:m="http://schemas.openxmlformats.org/officeDocument/2006/math">
                       <m:oMathParaPr>
@@ -9078,7 +8626,7 @@
               </p:txBody>
             </p:sp>
           </mc:Choice>
-          <mc:Fallback>
+          <mc:Fallback xmlns="">
             <p:sp>
               <p:nvSpPr>
                 <p:cNvPr id="2" name="TextBox 1"/>
@@ -9117,6 +8665,453 @@
             </p:sp>
           </mc:Fallback>
         </mc:AlternateContent>
+      </p:grpSp>
+      <p:grpSp>
+        <p:nvGrpSpPr>
+          <p:cNvPr id="22" name="Group 21"/>
+          <p:cNvGrpSpPr/>
+          <p:nvPr/>
+        </p:nvGrpSpPr>
+        <p:grpSpPr>
+          <a:xfrm>
+            <a:off x="1155624" y="3979003"/>
+            <a:ext cx="2738712" cy="2607131"/>
+            <a:chOff x="1155624" y="3979003"/>
+            <a:chExt cx="2738712" cy="2607131"/>
+          </a:xfrm>
+        </p:grpSpPr>
+        <p:grpSp>
+          <p:nvGrpSpPr>
+            <p:cNvPr id="40" name="Group 39"/>
+            <p:cNvGrpSpPr/>
+            <p:nvPr/>
+          </p:nvGrpSpPr>
+          <p:grpSpPr>
+            <a:xfrm>
+              <a:off x="1155624" y="3979003"/>
+              <a:ext cx="2738712" cy="2607131"/>
+              <a:chOff x="1155624" y="3979003"/>
+              <a:chExt cx="2738712" cy="2607131"/>
+            </a:xfrm>
+          </p:grpSpPr>
+          <p:grpSp>
+            <p:nvGrpSpPr>
+              <p:cNvPr id="13" name="Group 12"/>
+              <p:cNvGrpSpPr/>
+              <p:nvPr/>
+            </p:nvGrpSpPr>
+            <p:grpSpPr>
+              <a:xfrm>
+                <a:off x="1155624" y="4275977"/>
+                <a:ext cx="2310157" cy="2310157"/>
+                <a:chOff x="1155624" y="4275977"/>
+                <a:chExt cx="2310157" cy="2310157"/>
+              </a:xfrm>
+            </p:grpSpPr>
+            <p:sp>
+              <p:nvSpPr>
+                <p:cNvPr id="77" name="Oval 76"/>
+                <p:cNvSpPr/>
+                <p:nvPr/>
+              </p:nvSpPr>
+              <p:spPr>
+                <a:xfrm>
+                  <a:off x="1155624" y="4275977"/>
+                  <a:ext cx="2310157" cy="2310157"/>
+                </a:xfrm>
+                <a:prstGeom prst="ellipse">
+                  <a:avLst/>
+                </a:prstGeom>
+                <a:noFill/>
+                <a:ln w="38100">
+                  <a:solidFill>
+                    <a:schemeClr val="tx1"/>
+                  </a:solidFill>
+                  <a:prstDash val="dash"/>
+                </a:ln>
+              </p:spPr>
+              <p:style>
+                <a:lnRef idx="2">
+                  <a:schemeClr val="accent1">
+                    <a:shade val="50000"/>
+                  </a:schemeClr>
+                </a:lnRef>
+                <a:fillRef idx="1">
+                  <a:schemeClr val="accent1"/>
+                </a:fillRef>
+                <a:effectRef idx="0">
+                  <a:schemeClr val="accent1"/>
+                </a:effectRef>
+                <a:fontRef idx="minor">
+                  <a:schemeClr val="lt1"/>
+                </a:fontRef>
+              </p:style>
+              <p:txBody>
+                <a:bodyPr rtlCol="0" anchor="ctr"/>
+                <a:lstStyle/>
+                <a:p>
+                  <a:pPr algn="ctr"/>
+                  <a:endParaRPr lang="en-US"/>
+                </a:p>
+              </p:txBody>
+            </p:sp>
+            <p:sp>
+              <p:nvSpPr>
+                <p:cNvPr id="78" name="Oval 77"/>
+                <p:cNvSpPr/>
+                <p:nvPr/>
+              </p:nvSpPr>
+              <p:spPr>
+                <a:xfrm>
+                  <a:off x="2250230" y="5371172"/>
+                  <a:ext cx="120943" cy="119766"/>
+                </a:xfrm>
+                <a:prstGeom prst="ellipse">
+                  <a:avLst/>
+                </a:prstGeom>
+                <a:solidFill>
+                  <a:schemeClr val="tx1"/>
+                </a:solidFill>
+                <a:ln w="38100">
+                  <a:solidFill>
+                    <a:schemeClr val="tx1"/>
+                  </a:solidFill>
+                </a:ln>
+              </p:spPr>
+              <p:style>
+                <a:lnRef idx="2">
+                  <a:schemeClr val="accent1">
+                    <a:shade val="50000"/>
+                  </a:schemeClr>
+                </a:lnRef>
+                <a:fillRef idx="1">
+                  <a:schemeClr val="accent1"/>
+                </a:fillRef>
+                <a:effectRef idx="0">
+                  <a:schemeClr val="accent1"/>
+                </a:effectRef>
+                <a:fontRef idx="minor">
+                  <a:schemeClr val="lt1"/>
+                </a:fontRef>
+              </p:style>
+              <p:txBody>
+                <a:bodyPr rtlCol="0" anchor="ctr"/>
+                <a:lstStyle/>
+                <a:p>
+                  <a:pPr algn="ctr"/>
+                  <a:endParaRPr lang="en-US"/>
+                </a:p>
+              </p:txBody>
+            </p:sp>
+            <p:cxnSp>
+              <p:nvCxnSpPr>
+                <p:cNvPr id="3" name="Straight Connector 2"/>
+                <p:cNvCxnSpPr>
+                  <a:stCxn id="78" idx="7"/>
+                  <a:endCxn id="77" idx="7"/>
+                </p:cNvCxnSpPr>
+                <p:nvPr/>
+              </p:nvCxnSpPr>
+              <p:spPr>
+                <a:xfrm flipV="1">
+                  <a:off x="2353461" y="4614292"/>
+                  <a:ext cx="774005" cy="774419"/>
+                </a:xfrm>
+                <a:prstGeom prst="line">
+                  <a:avLst/>
+                </a:prstGeom>
+                <a:ln w="38100">
+                  <a:solidFill>
+                    <a:schemeClr val="tx1"/>
+                  </a:solidFill>
+                </a:ln>
+              </p:spPr>
+              <p:style>
+                <a:lnRef idx="1">
+                  <a:schemeClr val="accent1"/>
+                </a:lnRef>
+                <a:fillRef idx="0">
+                  <a:schemeClr val="accent1"/>
+                </a:fillRef>
+                <a:effectRef idx="0">
+                  <a:schemeClr val="accent1"/>
+                </a:effectRef>
+                <a:fontRef idx="minor">
+                  <a:schemeClr val="tx1"/>
+                </a:fontRef>
+              </p:style>
+            </p:cxnSp>
+            <mc:AlternateContent xmlns:mc="http://schemas.openxmlformats.org/markup-compatibility/2006" xmlns:a14="http://schemas.microsoft.com/office/drawing/2010/main">
+              <mc:Choice Requires="a14">
+                <p:sp>
+                  <p:nvSpPr>
+                    <p:cNvPr id="12" name="TextBox 11"/>
+                    <p:cNvSpPr txBox="1"/>
+                    <p:nvPr/>
+                  </p:nvSpPr>
+                  <p:spPr>
+                    <a:xfrm>
+                      <a:off x="2414177" y="4819026"/>
+                      <a:ext cx="241540" cy="307777"/>
+                    </a:xfrm>
+                    <a:prstGeom prst="rect">
+                      <a:avLst/>
+                    </a:prstGeom>
+                    <a:noFill/>
+                  </p:spPr>
+                  <p:txBody>
+                    <a:bodyPr wrap="none" lIns="0" tIns="0" rIns="0" bIns="0" rtlCol="0">
+                      <a:spAutoFit/>
+                    </a:bodyPr>
+                    <a:lstStyle/>
+                    <a:p>
+                      <a:pPr/>
+                      <a14:m>
+                        <m:oMathPara xmlns:m="http://schemas.openxmlformats.org/officeDocument/2006/math">
+                          <m:oMathParaPr>
+                            <m:jc m:val="centerGroup"/>
+                          </m:oMathParaPr>
+                          <m:oMath xmlns:m="http://schemas.openxmlformats.org/officeDocument/2006/math">
+                            <m:r>
+                              <a:rPr lang="en-US" sz="2000" b="0" i="1" smtClean="0">
+                                <a:latin typeface="Cambria Math" panose="02040503050406030204" pitchFamily="18" charset="0"/>
+                                <a:cs typeface="Arial" panose="020B0604020202020204" pitchFamily="34" charset="0"/>
+                              </a:rPr>
+                              <m:t>𝑅</m:t>
+                            </m:r>
+                          </m:oMath>
+                        </m:oMathPara>
+                      </a14:m>
+                      <a:endParaRPr lang="en-US" sz="2000" dirty="0" smtClean="0">
+                        <a:latin typeface="Arial" panose="020B0604020202020204" pitchFamily="34" charset="0"/>
+                        <a:cs typeface="Arial" panose="020B0604020202020204" pitchFamily="34" charset="0"/>
+                      </a:endParaRPr>
+                    </a:p>
+                  </p:txBody>
+                </p:sp>
+              </mc:Choice>
+              <mc:Fallback xmlns="">
+                <p:sp>
+                  <p:nvSpPr>
+                    <p:cNvPr id="12" name="TextBox 11"/>
+                    <p:cNvSpPr txBox="1">
+                      <a:spLocks noRot="1" noChangeAspect="1" noMove="1" noResize="1" noEditPoints="1" noAdjustHandles="1" noChangeArrowheads="1" noChangeShapeType="1" noTextEdit="1"/>
+                    </p:cNvSpPr>
+                    <p:nvPr/>
+                  </p:nvSpPr>
+                  <p:spPr>
+                    <a:xfrm>
+                      <a:off x="2414177" y="4819026"/>
+                      <a:ext cx="241540" cy="307777"/>
+                    </a:xfrm>
+                    <a:prstGeom prst="rect">
+                      <a:avLst/>
+                    </a:prstGeom>
+                    <a:blipFill>
+                      <a:blip r:embed="rId15"/>
+                      <a:stretch>
+                        <a:fillRect l="-20000" r="-20000" b="-10000"/>
+                      </a:stretch>
+                    </a:blipFill>
+                  </p:spPr>
+                  <p:txBody>
+                    <a:bodyPr/>
+                    <a:lstStyle/>
+                    <a:p>
+                      <a:r>
+                        <a:rPr lang="en-US">
+                          <a:noFill/>
+                        </a:rPr>
+                        <a:t> </a:t>
+                      </a:r>
+                    </a:p>
+                  </p:txBody>
+                </p:sp>
+              </mc:Fallback>
+            </mc:AlternateContent>
+          </p:grpSp>
+          <mc:AlternateContent xmlns:mc="http://schemas.openxmlformats.org/markup-compatibility/2006" xmlns:a14="http://schemas.microsoft.com/office/drawing/2010/main">
+            <mc:Choice Requires="a14">
+              <p:sp>
+                <p:nvSpPr>
+                  <p:cNvPr id="38" name="TextBox 37"/>
+                  <p:cNvSpPr txBox="1"/>
+                  <p:nvPr/>
+                </p:nvSpPr>
+                <p:spPr>
+                  <a:xfrm flipH="1">
+                    <a:off x="3068273" y="4246216"/>
+                    <a:ext cx="496685" cy="307777"/>
+                  </a:xfrm>
+                  <a:prstGeom prst="rect">
+                    <a:avLst/>
+                  </a:prstGeom>
+                  <a:noFill/>
+                </p:spPr>
+                <p:txBody>
+                  <a:bodyPr wrap="square" lIns="0" tIns="0" rIns="0" bIns="0" rtlCol="0">
+                    <a:spAutoFit/>
+                  </a:bodyPr>
+                  <a:lstStyle/>
+                  <a:p>
+                    <a:pPr/>
+                    <a14:m>
+                      <m:oMathPara xmlns:m="http://schemas.openxmlformats.org/officeDocument/2006/math">
+                        <m:oMathParaPr>
+                          <m:jc m:val="centerGroup"/>
+                        </m:oMathParaPr>
+                        <m:oMath xmlns:m="http://schemas.openxmlformats.org/officeDocument/2006/math">
+                          <m:r>
+                            <a:rPr lang="en-US" sz="2000" b="0" i="1" smtClean="0">
+                              <a:latin typeface="Cambria Math" panose="02040503050406030204" pitchFamily="18" charset="0"/>
+                              <a:cs typeface="Arial" panose="020B0604020202020204" pitchFamily="34" charset="0"/>
+                            </a:rPr>
+                            <m:t>𝑚</m:t>
+                          </m:r>
+                        </m:oMath>
+                      </m:oMathPara>
+                    </a14:m>
+                    <a:endParaRPr lang="en-US" sz="2000" dirty="0" smtClean="0">
+                      <a:latin typeface="Arial" panose="020B0604020202020204" pitchFamily="34" charset="0"/>
+                      <a:cs typeface="Arial" panose="020B0604020202020204" pitchFamily="34" charset="0"/>
+                    </a:endParaRPr>
+                  </a:p>
+                </p:txBody>
+              </p:sp>
+            </mc:Choice>
+            <mc:Fallback xmlns="">
+              <p:sp>
+                <p:nvSpPr>
+                  <p:cNvPr id="38" name="TextBox 37"/>
+                  <p:cNvSpPr txBox="1">
+                    <a:spLocks noRot="1" noChangeAspect="1" noMove="1" noResize="1" noEditPoints="1" noAdjustHandles="1" noChangeArrowheads="1" noChangeShapeType="1" noTextEdit="1"/>
+                  </p:cNvSpPr>
+                  <p:nvPr/>
+                </p:nvSpPr>
+                <p:spPr>
+                  <a:xfrm flipH="1">
+                    <a:off x="3068273" y="4246216"/>
+                    <a:ext cx="496685" cy="307777"/>
+                  </a:xfrm>
+                  <a:prstGeom prst="rect">
+                    <a:avLst/>
+                  </a:prstGeom>
+                  <a:blipFill>
+                    <a:blip r:embed="rId16"/>
+                    <a:stretch>
+                      <a:fillRect b="-2000"/>
+                    </a:stretch>
+                  </a:blipFill>
+                </p:spPr>
+                <p:txBody>
+                  <a:bodyPr/>
+                  <a:lstStyle/>
+                  <a:p>
+                    <a:r>
+                      <a:rPr lang="en-US">
+                        <a:noFill/>
+                      </a:rPr>
+                      <a:t> </a:t>
+                    </a:r>
+                  </a:p>
+                </p:txBody>
+              </p:sp>
+            </mc:Fallback>
+          </mc:AlternateContent>
+          <p:sp>
+            <p:nvSpPr>
+              <p:cNvPr id="39" name="Arc 38"/>
+              <p:cNvSpPr/>
+              <p:nvPr/>
+            </p:nvSpPr>
+            <p:spPr>
+              <a:xfrm>
+                <a:off x="1484599" y="3979003"/>
+                <a:ext cx="2409737" cy="2409737"/>
+              </a:xfrm>
+              <a:prstGeom prst="arc">
+                <a:avLst/>
+              </a:prstGeom>
+              <a:ln w="38100">
+                <a:solidFill>
+                  <a:schemeClr val="tx1"/>
+                </a:solidFill>
+                <a:headEnd type="triangle" w="med" len="med"/>
+                <a:tailEnd type="none" w="med" len="med"/>
+              </a:ln>
+            </p:spPr>
+            <p:style>
+              <a:lnRef idx="1">
+                <a:schemeClr val="accent1"/>
+              </a:lnRef>
+              <a:fillRef idx="0">
+                <a:schemeClr val="accent1"/>
+              </a:fillRef>
+              <a:effectRef idx="0">
+                <a:schemeClr val="accent1"/>
+              </a:effectRef>
+              <a:fontRef idx="minor">
+                <a:schemeClr val="tx1"/>
+              </a:fontRef>
+            </p:style>
+            <p:txBody>
+              <a:bodyPr rtlCol="0" anchor="ctr"/>
+              <a:lstStyle/>
+              <a:p>
+                <a:pPr algn="ctr"/>
+                <a:endParaRPr lang="en-US"/>
+              </a:p>
+            </p:txBody>
+          </p:sp>
+        </p:grpSp>
+        <p:sp>
+          <p:nvSpPr>
+            <p:cNvPr id="18" name="Rectangle 17"/>
+            <p:cNvSpPr/>
+            <p:nvPr/>
+          </p:nvSpPr>
+          <p:spPr>
+            <a:xfrm flipV="1">
+              <a:off x="3062165" y="4554614"/>
+              <a:ext cx="139675" cy="139675"/>
+            </a:xfrm>
+            <a:prstGeom prst="rect">
+              <a:avLst/>
+            </a:prstGeom>
+            <a:solidFill>
+              <a:schemeClr val="tx1"/>
+            </a:solidFill>
+            <a:ln w="38100">
+              <a:solidFill>
+                <a:schemeClr val="tx1"/>
+              </a:solidFill>
+            </a:ln>
+          </p:spPr>
+          <p:style>
+            <a:lnRef idx="2">
+              <a:schemeClr val="accent1">
+                <a:shade val="50000"/>
+              </a:schemeClr>
+            </a:lnRef>
+            <a:fillRef idx="1">
+              <a:schemeClr val="accent1"/>
+            </a:fillRef>
+            <a:effectRef idx="0">
+              <a:schemeClr val="accent1"/>
+            </a:effectRef>
+            <a:fontRef idx="minor">
+              <a:schemeClr val="lt1"/>
+            </a:fontRef>
+          </p:style>
+          <p:txBody>
+            <a:bodyPr rtlCol="0" anchor="ctr"/>
+            <a:lstStyle/>
+            <a:p>
+              <a:pPr algn="ctr"/>
+              <a:endParaRPr lang="en-US"/>
+            </a:p>
+          </p:txBody>
+        </p:sp>
       </p:grpSp>
     </p:spTree>
     <p:extLst>
@@ -9820,8 +9815,8 @@
                   </p:txBody>
                 </p:sp>
               </p:grpSp>
-              <mc:AlternateContent xmlns:mc="http://schemas.openxmlformats.org/markup-compatibility/2006">
-                <mc:Choice xmlns:a14="http://schemas.microsoft.com/office/drawing/2010/main" Requires="a14">
+              <mc:AlternateContent xmlns:mc="http://schemas.openxmlformats.org/markup-compatibility/2006" xmlns:a14="http://schemas.microsoft.com/office/drawing/2010/main">
+                <mc:Choice Requires="a14">
                   <p:sp>
                     <p:nvSpPr>
                       <p:cNvPr id="125" name="TextBox 124"/>
@@ -9844,6 +9839,7 @@
                       </a:bodyPr>
                       <a:lstStyle/>
                       <a:p>
+                        <a:pPr/>
                         <a14:m>
                           <m:oMathPara xmlns:m="http://schemas.openxmlformats.org/officeDocument/2006/math">
                             <m:oMathParaPr>
@@ -9881,7 +9877,7 @@
                     </p:txBody>
                   </p:sp>
                 </mc:Choice>
-                <mc:Fallback>
+                <mc:Fallback xmlns="">
                   <p:sp>
                     <p:nvSpPr>
                       <p:cNvPr id="125" name="TextBox 124"/>
@@ -9921,8 +9917,8 @@
                 </mc:Fallback>
               </mc:AlternateContent>
             </p:grpSp>
-            <mc:AlternateContent xmlns:mc="http://schemas.openxmlformats.org/markup-compatibility/2006">
-              <mc:Choice xmlns:a14="http://schemas.microsoft.com/office/drawing/2010/main" Requires="a14">
+            <mc:AlternateContent xmlns:mc="http://schemas.openxmlformats.org/markup-compatibility/2006" xmlns:a14="http://schemas.microsoft.com/office/drawing/2010/main">
+              <mc:Choice Requires="a14">
                 <p:sp>
                   <p:nvSpPr>
                     <p:cNvPr id="127" name="TextBox 126"/>
@@ -9945,6 +9941,7 @@
                     </a:bodyPr>
                     <a:lstStyle/>
                     <a:p>
+                      <a:pPr/>
                       <a14:m>
                         <m:oMathPara xmlns:m="http://schemas.openxmlformats.org/officeDocument/2006/math">
                           <m:oMathParaPr>
@@ -9969,7 +9966,7 @@
                   </p:txBody>
                 </p:sp>
               </mc:Choice>
-              <mc:Fallback>
+              <mc:Fallback xmlns="">
                 <p:sp>
                   <p:nvSpPr>
                     <p:cNvPr id="127" name="TextBox 126"/>
@@ -10056,8 +10053,8 @@
                 </a:p>
               </p:txBody>
             </p:sp>
-            <mc:AlternateContent xmlns:mc="http://schemas.openxmlformats.org/markup-compatibility/2006">
-              <mc:Choice xmlns:a14="http://schemas.microsoft.com/office/drawing/2010/main" Requires="a14">
+            <mc:AlternateContent xmlns:mc="http://schemas.openxmlformats.org/markup-compatibility/2006" xmlns:a14="http://schemas.microsoft.com/office/drawing/2010/main">
+              <mc:Choice Requires="a14">
                 <p:sp>
                   <p:nvSpPr>
                     <p:cNvPr id="134" name="TextBox 133"/>
@@ -10080,6 +10077,7 @@
                     </a:bodyPr>
                     <a:lstStyle/>
                     <a:p>
+                      <a:pPr/>
                       <a14:m>
                         <m:oMathPara xmlns:m="http://schemas.openxmlformats.org/officeDocument/2006/math">
                           <m:oMathParaPr>
@@ -10104,7 +10102,7 @@
                   </p:txBody>
                 </p:sp>
               </mc:Choice>
-              <mc:Fallback>
+              <mc:Fallback xmlns="">
                 <p:sp>
                   <p:nvSpPr>
                     <p:cNvPr id="134" name="TextBox 133"/>
@@ -10144,8 +10142,8 @@
               </mc:Fallback>
             </mc:AlternateContent>
           </p:grpSp>
-          <mc:AlternateContent xmlns:mc="http://schemas.openxmlformats.org/markup-compatibility/2006">
-            <mc:Choice xmlns:a14="http://schemas.microsoft.com/office/drawing/2010/main" Requires="a14">
+          <mc:AlternateContent xmlns:mc="http://schemas.openxmlformats.org/markup-compatibility/2006" xmlns:a14="http://schemas.microsoft.com/office/drawing/2010/main">
+            <mc:Choice Requires="a14">
               <p:sp>
                 <p:nvSpPr>
                   <p:cNvPr id="137" name="TextBox 136"/>
@@ -10168,6 +10166,7 @@
                   </a:bodyPr>
                   <a:lstStyle/>
                   <a:p>
+                    <a:pPr/>
                     <a14:m>
                       <m:oMathPara xmlns:m="http://schemas.openxmlformats.org/officeDocument/2006/math">
                         <m:oMathParaPr>
@@ -10234,7 +10233,7 @@
                 </p:txBody>
               </p:sp>
             </mc:Choice>
-            <mc:Fallback>
+            <mc:Fallback xmlns="">
               <p:sp>
                 <p:nvSpPr>
                   <p:cNvPr id="137" name="TextBox 136"/>
@@ -10313,8 +10312,8 @@
             </a:fontRef>
           </p:style>
         </p:cxnSp>
-        <mc:AlternateContent xmlns:mc="http://schemas.openxmlformats.org/markup-compatibility/2006">
-          <mc:Choice xmlns:a14="http://schemas.microsoft.com/office/drawing/2010/main" Requires="a14">
+        <mc:AlternateContent xmlns:mc="http://schemas.openxmlformats.org/markup-compatibility/2006" xmlns:a14="http://schemas.microsoft.com/office/drawing/2010/main">
+          <mc:Choice Requires="a14">
             <p:sp>
               <p:nvSpPr>
                 <p:cNvPr id="142" name="TextBox 141"/>
@@ -10337,6 +10336,7 @@
                 </a:bodyPr>
                 <a:lstStyle/>
                 <a:p>
+                  <a:pPr/>
                   <a14:m>
                     <m:oMathPara xmlns:m="http://schemas.openxmlformats.org/officeDocument/2006/math">
                       <m:oMathParaPr>
@@ -10374,7 +10374,7 @@
               </p:txBody>
             </p:sp>
           </mc:Choice>
-          <mc:Fallback>
+          <mc:Fallback xmlns="">
             <p:sp>
               <p:nvSpPr>
                 <p:cNvPr id="142" name="TextBox 141"/>
@@ -12006,8 +12006,8 @@
                 </a:fontRef>
               </p:style>
             </p:cxnSp>
-            <mc:AlternateContent xmlns:mc="http://schemas.openxmlformats.org/markup-compatibility/2006">
-              <mc:Choice xmlns:a14="http://schemas.microsoft.com/office/drawing/2010/main" Requires="a14">
+            <mc:AlternateContent xmlns:mc="http://schemas.openxmlformats.org/markup-compatibility/2006" xmlns:a14="http://schemas.microsoft.com/office/drawing/2010/main">
+              <mc:Choice Requires="a14">
                 <p:sp>
                   <p:nvSpPr>
                     <p:cNvPr id="55" name="TextBox 54"/>
@@ -12030,6 +12030,7 @@
                     </a:bodyPr>
                     <a:lstStyle/>
                     <a:p>
+                      <a:pPr/>
                       <a14:m>
                         <m:oMathPara xmlns:m="http://schemas.openxmlformats.org/officeDocument/2006/math">
                           <m:oMathParaPr>
@@ -12095,7 +12096,7 @@
                   </p:txBody>
                 </p:sp>
               </mc:Choice>
-              <mc:Fallback>
+              <mc:Fallback xmlns="">
                 <p:sp>
                   <p:nvSpPr>
                     <p:cNvPr id="55" name="TextBox 54"/>
@@ -12134,8 +12135,8 @@
                 </p:sp>
               </mc:Fallback>
             </mc:AlternateContent>
-            <mc:AlternateContent xmlns:mc="http://schemas.openxmlformats.org/markup-compatibility/2006">
-              <mc:Choice xmlns:a14="http://schemas.microsoft.com/office/drawing/2010/main" Requires="a14">
+            <mc:AlternateContent xmlns:mc="http://schemas.openxmlformats.org/markup-compatibility/2006" xmlns:a14="http://schemas.microsoft.com/office/drawing/2010/main">
+              <mc:Choice Requires="a14">
                 <p:sp>
                   <p:nvSpPr>
                     <p:cNvPr id="56" name="TextBox 55"/>
@@ -12158,6 +12159,7 @@
                     </a:bodyPr>
                     <a:lstStyle/>
                     <a:p>
+                      <a:pPr/>
                       <a14:m>
                         <m:oMathPara xmlns:m="http://schemas.openxmlformats.org/officeDocument/2006/math">
                           <m:oMathParaPr>
@@ -12223,7 +12225,7 @@
                   </p:txBody>
                 </p:sp>
               </mc:Choice>
-              <mc:Fallback>
+              <mc:Fallback xmlns="">
                 <p:sp>
                   <p:nvSpPr>
                     <p:cNvPr id="56" name="TextBox 55"/>
@@ -12262,8 +12264,8 @@
                 </p:sp>
               </mc:Fallback>
             </mc:AlternateContent>
-            <mc:AlternateContent xmlns:mc="http://schemas.openxmlformats.org/markup-compatibility/2006">
-              <mc:Choice xmlns:a14="http://schemas.microsoft.com/office/drawing/2010/main" Requires="a14">
+            <mc:AlternateContent xmlns:mc="http://schemas.openxmlformats.org/markup-compatibility/2006" xmlns:a14="http://schemas.microsoft.com/office/drawing/2010/main">
+              <mc:Choice Requires="a14">
                 <p:sp>
                   <p:nvSpPr>
                     <p:cNvPr id="57" name="TextBox 56"/>
@@ -12286,6 +12288,7 @@
                     </a:bodyPr>
                     <a:lstStyle/>
                     <a:p>
+                      <a:pPr/>
                       <a14:m>
                         <m:oMathPara xmlns:m="http://schemas.openxmlformats.org/officeDocument/2006/math">
                           <m:oMathParaPr>
@@ -12351,7 +12354,7 @@
                   </p:txBody>
                 </p:sp>
               </mc:Choice>
-              <mc:Fallback>
+              <mc:Fallback xmlns="">
                 <p:sp>
                   <p:nvSpPr>
                     <p:cNvPr id="57" name="TextBox 56"/>
@@ -12390,8 +12393,8 @@
                 </p:sp>
               </mc:Fallback>
             </mc:AlternateContent>
-            <mc:AlternateContent xmlns:mc="http://schemas.openxmlformats.org/markup-compatibility/2006">
-              <mc:Choice xmlns:a14="http://schemas.microsoft.com/office/drawing/2010/main" Requires="a14">
+            <mc:AlternateContent xmlns:mc="http://schemas.openxmlformats.org/markup-compatibility/2006" xmlns:a14="http://schemas.microsoft.com/office/drawing/2010/main">
+              <mc:Choice Requires="a14">
                 <p:sp>
                   <p:nvSpPr>
                     <p:cNvPr id="58" name="TextBox 57"/>
@@ -12414,6 +12417,7 @@
                     </a:bodyPr>
                     <a:lstStyle/>
                     <a:p>
+                      <a:pPr/>
                       <a14:m>
                         <m:oMathPara xmlns:m="http://schemas.openxmlformats.org/officeDocument/2006/math">
                           <m:oMathParaPr>
@@ -12479,7 +12483,7 @@
                   </p:txBody>
                 </p:sp>
               </mc:Choice>
-              <mc:Fallback>
+              <mc:Fallback xmlns="">
                 <p:sp>
                   <p:nvSpPr>
                     <p:cNvPr id="58" name="TextBox 57"/>
@@ -12518,8 +12522,8 @@
                 </p:sp>
               </mc:Fallback>
             </mc:AlternateContent>
-            <mc:AlternateContent xmlns:mc="http://schemas.openxmlformats.org/markup-compatibility/2006">
-              <mc:Choice xmlns:a14="http://schemas.microsoft.com/office/drawing/2010/main" Requires="a14">
+            <mc:AlternateContent xmlns:mc="http://schemas.openxmlformats.org/markup-compatibility/2006" xmlns:a14="http://schemas.microsoft.com/office/drawing/2010/main">
+              <mc:Choice Requires="a14">
                 <p:sp>
                   <p:nvSpPr>
                     <p:cNvPr id="59" name="TextBox 58"/>
@@ -12542,6 +12546,7 @@
                     </a:bodyPr>
                     <a:lstStyle/>
                     <a:p>
+                      <a:pPr/>
                       <a14:m>
                         <m:oMathPara xmlns:m="http://schemas.openxmlformats.org/officeDocument/2006/math">
                           <m:oMathParaPr>
@@ -12607,7 +12612,7 @@
                   </p:txBody>
                 </p:sp>
               </mc:Choice>
-              <mc:Fallback>
+              <mc:Fallback xmlns="">
                 <p:sp>
                   <p:nvSpPr>
                     <p:cNvPr id="59" name="TextBox 58"/>
@@ -13459,8 +13464,8 @@
             </p:txBody>
           </p:sp>
         </p:grpSp>
-        <mc:AlternateContent xmlns:mc="http://schemas.openxmlformats.org/markup-compatibility/2006">
-          <mc:Choice xmlns:a14="http://schemas.microsoft.com/office/drawing/2010/main" Requires="a14">
+        <mc:AlternateContent xmlns:mc="http://schemas.openxmlformats.org/markup-compatibility/2006" xmlns:a14="http://schemas.microsoft.com/office/drawing/2010/main">
+          <mc:Choice Requires="a14">
             <p:sp>
               <p:nvSpPr>
                 <p:cNvPr id="151" name="TextBox 150"/>
@@ -13483,6 +13488,7 @@
                 </a:bodyPr>
                 <a:lstStyle/>
                 <a:p>
+                  <a:pPr/>
                   <a14:m>
                     <m:oMathPara xmlns:m="http://schemas.openxmlformats.org/officeDocument/2006/math">
                       <m:oMathParaPr>
@@ -13548,7 +13554,7 @@
               </p:txBody>
             </p:sp>
           </mc:Choice>
-          <mc:Fallback>
+          <mc:Fallback xmlns="">
             <p:sp>
               <p:nvSpPr>
                 <p:cNvPr id="151" name="TextBox 150"/>
@@ -13587,8 +13593,8 @@
             </p:sp>
           </mc:Fallback>
         </mc:AlternateContent>
-        <mc:AlternateContent xmlns:mc="http://schemas.openxmlformats.org/markup-compatibility/2006">
-          <mc:Choice xmlns:a14="http://schemas.microsoft.com/office/drawing/2010/main" Requires="a14">
+        <mc:AlternateContent xmlns:mc="http://schemas.openxmlformats.org/markup-compatibility/2006" xmlns:a14="http://schemas.microsoft.com/office/drawing/2010/main">
+          <mc:Choice Requires="a14">
             <p:sp>
               <p:nvSpPr>
                 <p:cNvPr id="152" name="TextBox 151"/>
@@ -13611,6 +13617,7 @@
                 </a:bodyPr>
                 <a:lstStyle/>
                 <a:p>
+                  <a:pPr/>
                   <a14:m>
                     <m:oMathPara xmlns:m="http://schemas.openxmlformats.org/officeDocument/2006/math">
                       <m:oMathParaPr>
@@ -13676,7 +13683,7 @@
               </p:txBody>
             </p:sp>
           </mc:Choice>
-          <mc:Fallback>
+          <mc:Fallback xmlns="">
             <p:sp>
               <p:nvSpPr>
                 <p:cNvPr id="152" name="TextBox 151"/>
@@ -13715,8 +13722,8 @@
             </p:sp>
           </mc:Fallback>
         </mc:AlternateContent>
-        <mc:AlternateContent xmlns:mc="http://schemas.openxmlformats.org/markup-compatibility/2006">
-          <mc:Choice xmlns:a14="http://schemas.microsoft.com/office/drawing/2010/main" Requires="a14">
+        <mc:AlternateContent xmlns:mc="http://schemas.openxmlformats.org/markup-compatibility/2006" xmlns:a14="http://schemas.microsoft.com/office/drawing/2010/main">
+          <mc:Choice Requires="a14">
             <p:sp>
               <p:nvSpPr>
                 <p:cNvPr id="153" name="TextBox 152"/>
@@ -13739,6 +13746,7 @@
                 </a:bodyPr>
                 <a:lstStyle/>
                 <a:p>
+                  <a:pPr/>
                   <a14:m>
                     <m:oMathPara xmlns:m="http://schemas.openxmlformats.org/officeDocument/2006/math">
                       <m:oMathParaPr>
@@ -13804,7 +13812,7 @@
               </p:txBody>
             </p:sp>
           </mc:Choice>
-          <mc:Fallback>
+          <mc:Fallback xmlns="">
             <p:sp>
               <p:nvSpPr>
                 <p:cNvPr id="153" name="TextBox 152"/>
@@ -13843,8 +13851,8 @@
             </p:sp>
           </mc:Fallback>
         </mc:AlternateContent>
-        <mc:AlternateContent xmlns:mc="http://schemas.openxmlformats.org/markup-compatibility/2006">
-          <mc:Choice xmlns:a14="http://schemas.microsoft.com/office/drawing/2010/main" Requires="a14">
+        <mc:AlternateContent xmlns:mc="http://schemas.openxmlformats.org/markup-compatibility/2006" xmlns:a14="http://schemas.microsoft.com/office/drawing/2010/main">
+          <mc:Choice Requires="a14">
             <p:sp>
               <p:nvSpPr>
                 <p:cNvPr id="154" name="TextBox 153"/>
@@ -13867,6 +13875,7 @@
                 </a:bodyPr>
                 <a:lstStyle/>
                 <a:p>
+                  <a:pPr/>
                   <a14:m>
                     <m:oMathPara xmlns:m="http://schemas.openxmlformats.org/officeDocument/2006/math">
                       <m:oMathParaPr>
@@ -13932,7 +13941,7 @@
               </p:txBody>
             </p:sp>
           </mc:Choice>
-          <mc:Fallback>
+          <mc:Fallback xmlns="">
             <p:sp>
               <p:nvSpPr>
                 <p:cNvPr id="154" name="TextBox 153"/>
@@ -13971,8 +13980,8 @@
             </p:sp>
           </mc:Fallback>
         </mc:AlternateContent>
-        <mc:AlternateContent xmlns:mc="http://schemas.openxmlformats.org/markup-compatibility/2006">
-          <mc:Choice xmlns:a14="http://schemas.microsoft.com/office/drawing/2010/main" Requires="a14">
+        <mc:AlternateContent xmlns:mc="http://schemas.openxmlformats.org/markup-compatibility/2006" xmlns:a14="http://schemas.microsoft.com/office/drawing/2010/main">
+          <mc:Choice Requires="a14">
             <p:sp>
               <p:nvSpPr>
                 <p:cNvPr id="155" name="TextBox 154"/>
@@ -13995,6 +14004,7 @@
                 </a:bodyPr>
                 <a:lstStyle/>
                 <a:p>
+                  <a:pPr/>
                   <a14:m>
                     <m:oMathPara xmlns:m="http://schemas.openxmlformats.org/officeDocument/2006/math">
                       <m:oMathParaPr>
@@ -14060,7 +14070,7 @@
               </p:txBody>
             </p:sp>
           </mc:Choice>
-          <mc:Fallback>
+          <mc:Fallback xmlns="">
             <p:sp>
               <p:nvSpPr>
                 <p:cNvPr id="155" name="TextBox 154"/>
@@ -14740,8 +14750,8 @@
               </p:txBody>
             </p:sp>
           </p:grpSp>
-          <mc:AlternateContent xmlns:mc="http://schemas.openxmlformats.org/markup-compatibility/2006">
-            <mc:Choice xmlns:a14="http://schemas.microsoft.com/office/drawing/2010/main" Requires="a14">
+          <mc:AlternateContent xmlns:mc="http://schemas.openxmlformats.org/markup-compatibility/2006" xmlns:a14="http://schemas.microsoft.com/office/drawing/2010/main">
+            <mc:Choice Requires="a14">
               <p:sp>
                 <p:nvSpPr>
                   <p:cNvPr id="177" name="TextBox 176"/>
@@ -14764,6 +14774,7 @@
                   </a:bodyPr>
                   <a:lstStyle/>
                   <a:p>
+                    <a:pPr/>
                     <a14:m>
                       <m:oMathPara xmlns:m="http://schemas.openxmlformats.org/officeDocument/2006/math">
                         <m:oMathParaPr>
@@ -14808,7 +14819,7 @@
                 </p:txBody>
               </p:sp>
             </mc:Choice>
-            <mc:Fallback>
+            <mc:Fallback xmlns="">
               <p:sp>
                 <p:nvSpPr>
                   <p:cNvPr id="177" name="TextBox 176"/>
@@ -14961,8 +14972,8 @@
               </a:fontRef>
             </p:style>
           </p:cxnSp>
-          <mc:AlternateContent xmlns:mc="http://schemas.openxmlformats.org/markup-compatibility/2006">
-            <mc:Choice xmlns:a14="http://schemas.microsoft.com/office/drawing/2010/main" Requires="a14">
+          <mc:AlternateContent xmlns:mc="http://schemas.openxmlformats.org/markup-compatibility/2006" xmlns:a14="http://schemas.microsoft.com/office/drawing/2010/main">
+            <mc:Choice Requires="a14">
               <p:sp>
                 <p:nvSpPr>
                   <p:cNvPr id="198" name="TextBox 197"/>
@@ -14985,6 +14996,7 @@
                   </a:bodyPr>
                   <a:lstStyle/>
                   <a:p>
+                    <a:pPr/>
                     <a14:m>
                       <m:oMathPara xmlns:m="http://schemas.openxmlformats.org/officeDocument/2006/math">
                         <m:oMathParaPr>
@@ -15050,7 +15062,7 @@
                 </p:txBody>
               </p:sp>
             </mc:Choice>
-            <mc:Fallback>
+            <mc:Fallback xmlns="">
               <p:sp>
                 <p:nvSpPr>
                   <p:cNvPr id="198" name="TextBox 197"/>
@@ -15128,8 +15140,8 @@
               </a:fontRef>
             </p:style>
           </p:cxnSp>
-          <mc:AlternateContent xmlns:mc="http://schemas.openxmlformats.org/markup-compatibility/2006">
-            <mc:Choice xmlns:a14="http://schemas.microsoft.com/office/drawing/2010/main" Requires="a14">
+          <mc:AlternateContent xmlns:mc="http://schemas.openxmlformats.org/markup-compatibility/2006" xmlns:a14="http://schemas.microsoft.com/office/drawing/2010/main">
+            <mc:Choice Requires="a14">
               <p:sp>
                 <p:nvSpPr>
                   <p:cNvPr id="204" name="TextBox 203"/>
@@ -15152,6 +15164,7 @@
                   </a:bodyPr>
                   <a:lstStyle/>
                   <a:p>
+                    <a:pPr/>
                     <a14:m>
                       <m:oMathPara xmlns:m="http://schemas.openxmlformats.org/officeDocument/2006/math">
                         <m:oMathParaPr>
@@ -15189,7 +15202,7 @@
                 </p:txBody>
               </p:sp>
             </mc:Choice>
-            <mc:Fallback>
+            <mc:Fallback xmlns="">
               <p:sp>
                 <p:nvSpPr>
                   <p:cNvPr id="204" name="TextBox 203"/>
@@ -15267,8 +15280,8 @@
             </a:fontRef>
           </p:style>
         </p:cxnSp>
-        <mc:AlternateContent xmlns:mc="http://schemas.openxmlformats.org/markup-compatibility/2006">
-          <mc:Choice xmlns:a14="http://schemas.microsoft.com/office/drawing/2010/main" Requires="a14">
+        <mc:AlternateContent xmlns:mc="http://schemas.openxmlformats.org/markup-compatibility/2006" xmlns:a14="http://schemas.microsoft.com/office/drawing/2010/main">
+          <mc:Choice Requires="a14">
             <p:sp>
               <p:nvSpPr>
                 <p:cNvPr id="209" name="TextBox 208"/>
@@ -15291,6 +15304,7 @@
                 </a:bodyPr>
                 <a:lstStyle/>
                 <a:p>
+                  <a:pPr/>
                   <a14:m>
                     <m:oMathPara xmlns:m="http://schemas.openxmlformats.org/officeDocument/2006/math">
                       <m:oMathParaPr>
@@ -15349,7 +15363,7 @@
               </p:txBody>
             </p:sp>
           </mc:Choice>
-          <mc:Fallback>
+          <mc:Fallback xmlns="">
             <p:sp>
               <p:nvSpPr>
                 <p:cNvPr id="209" name="TextBox 208"/>
@@ -15580,8 +15594,8 @@
               </a:fontRef>
             </p:style>
           </p:cxnSp>
-          <mc:AlternateContent xmlns:mc="http://schemas.openxmlformats.org/markup-compatibility/2006">
-            <mc:Choice xmlns:a14="http://schemas.microsoft.com/office/drawing/2010/main" Requires="a14">
+          <mc:AlternateContent xmlns:mc="http://schemas.openxmlformats.org/markup-compatibility/2006" xmlns:a14="http://schemas.microsoft.com/office/drawing/2010/main">
+            <mc:Choice Requires="a14">
               <p:sp>
                 <p:nvSpPr>
                   <p:cNvPr id="8" name="TextBox 7"/>
@@ -15604,6 +15618,7 @@
                   </a:bodyPr>
                   <a:lstStyle/>
                   <a:p>
+                    <a:pPr/>
                     <a14:m>
                       <m:oMathPara xmlns:m="http://schemas.openxmlformats.org/officeDocument/2006/math">
                         <m:oMathParaPr>
@@ -15628,7 +15643,7 @@
                 </p:txBody>
               </p:sp>
             </mc:Choice>
-            <mc:Fallback>
+            <mc:Fallback xmlns="">
               <p:sp>
                 <p:nvSpPr>
                   <p:cNvPr id="8" name="TextBox 7"/>
@@ -15667,8 +15682,8 @@
               </p:sp>
             </mc:Fallback>
           </mc:AlternateContent>
-          <mc:AlternateContent xmlns:mc="http://schemas.openxmlformats.org/markup-compatibility/2006">
-            <mc:Choice xmlns:a14="http://schemas.microsoft.com/office/drawing/2010/main" Requires="a14">
+          <mc:AlternateContent xmlns:mc="http://schemas.openxmlformats.org/markup-compatibility/2006" xmlns:a14="http://schemas.microsoft.com/office/drawing/2010/main">
+            <mc:Choice Requires="a14">
               <p:sp>
                 <p:nvSpPr>
                   <p:cNvPr id="9" name="TextBox 8"/>
@@ -15691,6 +15706,7 @@
                   </a:bodyPr>
                   <a:lstStyle/>
                   <a:p>
+                    <a:pPr/>
                     <a14:m>
                       <m:oMathPara xmlns:m="http://schemas.openxmlformats.org/officeDocument/2006/math">
                         <m:oMathParaPr>
@@ -15715,7 +15731,7 @@
                 </p:txBody>
               </p:sp>
             </mc:Choice>
-            <mc:Fallback>
+            <mc:Fallback xmlns="">
               <p:sp>
                 <p:nvSpPr>
                   <p:cNvPr id="9" name="TextBox 8"/>
@@ -15754,8 +15770,8 @@
               </p:sp>
             </mc:Fallback>
           </mc:AlternateContent>
-          <mc:AlternateContent xmlns:mc="http://schemas.openxmlformats.org/markup-compatibility/2006">
-            <mc:Choice xmlns:a14="http://schemas.microsoft.com/office/drawing/2010/main" Requires="a14">
+          <mc:AlternateContent xmlns:mc="http://schemas.openxmlformats.org/markup-compatibility/2006" xmlns:a14="http://schemas.microsoft.com/office/drawing/2010/main">
+            <mc:Choice Requires="a14">
               <p:sp>
                 <p:nvSpPr>
                   <p:cNvPr id="10" name="TextBox 9"/>
@@ -15778,6 +15794,7 @@
                   </a:bodyPr>
                   <a:lstStyle/>
                   <a:p>
+                    <a:pPr/>
                     <a14:m>
                       <m:oMathPara xmlns:m="http://schemas.openxmlformats.org/officeDocument/2006/math">
                         <m:oMathParaPr>
@@ -15816,7 +15833,7 @@
                 </p:txBody>
               </p:sp>
             </mc:Choice>
-            <mc:Fallback>
+            <mc:Fallback xmlns="">
               <p:sp>
                 <p:nvSpPr>
                   <p:cNvPr id="10" name="TextBox 9"/>
@@ -16506,8 +16523,8 @@
                     </a:fontRef>
                   </p:style>
                 </p:cxnSp>
-                <mc:AlternateContent xmlns:mc="http://schemas.openxmlformats.org/markup-compatibility/2006">
-                  <mc:Choice xmlns:a14="http://schemas.microsoft.com/office/drawing/2010/main" Requires="a14">
+                <mc:AlternateContent xmlns:mc="http://schemas.openxmlformats.org/markup-compatibility/2006" xmlns:a14="http://schemas.microsoft.com/office/drawing/2010/main">
+                  <mc:Choice Requires="a14">
                     <p:sp>
                       <p:nvSpPr>
                         <p:cNvPr id="32" name="TextBox 31"/>
@@ -16530,6 +16547,7 @@
                         </a:bodyPr>
                         <a:lstStyle/>
                         <a:p>
+                          <a:pPr/>
                           <a14:m>
                             <m:oMathPara xmlns:m="http://schemas.openxmlformats.org/officeDocument/2006/math">
                               <m:oMathParaPr>
@@ -16554,7 +16572,7 @@
                       </p:txBody>
                     </p:sp>
                   </mc:Choice>
-                  <mc:Fallback>
+                  <mc:Fallback xmlns="">
                     <p:sp>
                       <p:nvSpPr>
                         <p:cNvPr id="32" name="TextBox 31"/>
@@ -16593,8 +16611,8 @@
                     </p:sp>
                   </mc:Fallback>
                 </mc:AlternateContent>
-                <mc:AlternateContent xmlns:mc="http://schemas.openxmlformats.org/markup-compatibility/2006">
-                  <mc:Choice xmlns:a14="http://schemas.microsoft.com/office/drawing/2010/main" Requires="a14">
+                <mc:AlternateContent xmlns:mc="http://schemas.openxmlformats.org/markup-compatibility/2006" xmlns:a14="http://schemas.microsoft.com/office/drawing/2010/main">
+                  <mc:Choice Requires="a14">
                     <p:sp>
                       <p:nvSpPr>
                         <p:cNvPr id="33" name="TextBox 32"/>
@@ -16617,6 +16635,7 @@
                         </a:bodyPr>
                         <a:lstStyle/>
                         <a:p>
+                          <a:pPr/>
                           <a14:m>
                             <m:oMathPara xmlns:m="http://schemas.openxmlformats.org/officeDocument/2006/math">
                               <m:oMathParaPr>
@@ -16654,7 +16673,7 @@
                       </p:txBody>
                     </p:sp>
                   </mc:Choice>
-                  <mc:Fallback>
+                  <mc:Fallback xmlns="">
                     <p:sp>
                       <p:nvSpPr>
                         <p:cNvPr id="33" name="TextBox 32"/>
@@ -16693,8 +16712,8 @@
                     </p:sp>
                   </mc:Fallback>
                 </mc:AlternateContent>
-                <mc:AlternateContent xmlns:mc="http://schemas.openxmlformats.org/markup-compatibility/2006">
-                  <mc:Choice xmlns:a14="http://schemas.microsoft.com/office/drawing/2010/main" Requires="a14">
+                <mc:AlternateContent xmlns:mc="http://schemas.openxmlformats.org/markup-compatibility/2006" xmlns:a14="http://schemas.microsoft.com/office/drawing/2010/main">
+                  <mc:Choice Requires="a14">
                     <p:sp>
                       <p:nvSpPr>
                         <p:cNvPr id="34" name="TextBox 33"/>
@@ -16717,6 +16736,7 @@
                         </a:bodyPr>
                         <a:lstStyle/>
                         <a:p>
+                          <a:pPr/>
                           <a14:m>
                             <m:oMathPara xmlns:m="http://schemas.openxmlformats.org/officeDocument/2006/math">
                               <m:oMathParaPr>
@@ -16775,7 +16795,7 @@
                       </p:txBody>
                     </p:sp>
                   </mc:Choice>
-                  <mc:Fallback>
+                  <mc:Fallback xmlns="">
                     <p:sp>
                       <p:nvSpPr>
                         <p:cNvPr id="34" name="TextBox 33"/>
@@ -16850,8 +16870,8 @@
                     </a:fontRef>
                   </p:style>
                 </p:cxnSp>
-                <mc:AlternateContent xmlns:mc="http://schemas.openxmlformats.org/markup-compatibility/2006">
-                  <mc:Choice xmlns:a14="http://schemas.microsoft.com/office/drawing/2010/main" Requires="a14">
+                <mc:AlternateContent xmlns:mc="http://schemas.openxmlformats.org/markup-compatibility/2006" xmlns:a14="http://schemas.microsoft.com/office/drawing/2010/main">
+                  <mc:Choice Requires="a14">
                     <p:sp>
                       <p:nvSpPr>
                         <p:cNvPr id="38" name="TextBox 37"/>
@@ -16874,6 +16894,7 @@
                         </a:bodyPr>
                         <a:lstStyle/>
                         <a:p>
+                          <a:pPr/>
                           <a14:m>
                             <m:oMathPara xmlns:m="http://schemas.openxmlformats.org/officeDocument/2006/math">
                               <m:oMathParaPr>
@@ -16932,7 +16953,7 @@
                       </p:txBody>
                     </p:sp>
                   </mc:Choice>
-                  <mc:Fallback>
+                  <mc:Fallback xmlns="">
                     <p:sp>
                       <p:nvSpPr>
                         <p:cNvPr id="38" name="TextBox 37"/>
@@ -16972,8 +16993,8 @@
                   </mc:Fallback>
                 </mc:AlternateContent>
               </p:grpSp>
-              <mc:AlternateContent xmlns:mc="http://schemas.openxmlformats.org/markup-compatibility/2006">
-                <mc:Choice xmlns:a14="http://schemas.microsoft.com/office/drawing/2010/main" Requires="a14">
+              <mc:AlternateContent xmlns:mc="http://schemas.openxmlformats.org/markup-compatibility/2006" xmlns:a14="http://schemas.microsoft.com/office/drawing/2010/main">
+                <mc:Choice Requires="a14">
                   <p:sp>
                     <p:nvSpPr>
                       <p:cNvPr id="41" name="TextBox 40"/>
@@ -16996,6 +17017,7 @@
                       </a:bodyPr>
                       <a:lstStyle/>
                       <a:p>
+                        <a:pPr/>
                         <a14:m>
                           <m:oMathPara xmlns:m="http://schemas.openxmlformats.org/officeDocument/2006/math">
                             <m:oMathParaPr>
@@ -17020,7 +17042,7 @@
                     </p:txBody>
                   </p:sp>
                 </mc:Choice>
-                <mc:Fallback>
+                <mc:Fallback xmlns="">
                   <p:sp>
                     <p:nvSpPr>
                       <p:cNvPr id="41" name="TextBox 40"/>
@@ -17059,8 +17081,8 @@
                   </p:sp>
                 </mc:Fallback>
               </mc:AlternateContent>
-              <mc:AlternateContent xmlns:mc="http://schemas.openxmlformats.org/markup-compatibility/2006">
-                <mc:Choice xmlns:a14="http://schemas.microsoft.com/office/drawing/2010/main" Requires="a14">
+              <mc:AlternateContent xmlns:mc="http://schemas.openxmlformats.org/markup-compatibility/2006" xmlns:a14="http://schemas.microsoft.com/office/drawing/2010/main">
+                <mc:Choice Requires="a14">
                   <p:sp>
                     <p:nvSpPr>
                       <p:cNvPr id="42" name="TextBox 41"/>
@@ -17083,6 +17105,7 @@
                       </a:bodyPr>
                       <a:lstStyle/>
                       <a:p>
+                        <a:pPr/>
                         <a14:m>
                           <m:oMathPara xmlns:m="http://schemas.openxmlformats.org/officeDocument/2006/math">
                             <m:oMathParaPr>
@@ -17107,7 +17130,7 @@
                     </p:txBody>
                   </p:sp>
                 </mc:Choice>
-                <mc:Fallback>
+                <mc:Fallback xmlns="">
                   <p:sp>
                     <p:nvSpPr>
                       <p:cNvPr id="42" name="TextBox 41"/>
@@ -17230,8 +17253,8 @@
                 </a:p>
               </p:txBody>
             </p:sp>
-            <mc:AlternateContent xmlns:mc="http://schemas.openxmlformats.org/markup-compatibility/2006">
-              <mc:Choice xmlns:a14="http://schemas.microsoft.com/office/drawing/2010/main" Requires="a14">
+            <mc:AlternateContent xmlns:mc="http://schemas.openxmlformats.org/markup-compatibility/2006" xmlns:a14="http://schemas.microsoft.com/office/drawing/2010/main">
+              <mc:Choice Requires="a14">
                 <p:sp>
                   <p:nvSpPr>
                     <p:cNvPr id="51" name="TextBox 50"/>
@@ -17254,6 +17277,7 @@
                     </a:bodyPr>
                     <a:lstStyle/>
                     <a:p>
+                      <a:pPr/>
                       <a14:m>
                         <m:oMathPara xmlns:m="http://schemas.openxmlformats.org/officeDocument/2006/math">
                           <m:oMathParaPr>
@@ -17312,7 +17336,7 @@
                   </p:txBody>
                 </p:sp>
               </mc:Choice>
-              <mc:Fallback>
+              <mc:Fallback xmlns="">
                 <p:sp>
                   <p:nvSpPr>
                     <p:cNvPr id="51" name="TextBox 50"/>
@@ -17843,8 +17867,8 @@
               </p:txBody>
             </p:sp>
           </p:grpSp>
-          <mc:AlternateContent xmlns:mc="http://schemas.openxmlformats.org/markup-compatibility/2006">
-            <mc:Choice xmlns:a14="http://schemas.microsoft.com/office/drawing/2010/main" Requires="a14">
+          <mc:AlternateContent xmlns:mc="http://schemas.openxmlformats.org/markup-compatibility/2006" xmlns:a14="http://schemas.microsoft.com/office/drawing/2010/main">
+            <mc:Choice Requires="a14">
               <p:sp>
                 <p:nvSpPr>
                   <p:cNvPr id="64" name="TextBox 63"/>
@@ -17867,6 +17891,7 @@
                   </a:bodyPr>
                   <a:lstStyle/>
                   <a:p>
+                    <a:pPr/>
                     <a14:m>
                       <m:oMathPara xmlns:m="http://schemas.openxmlformats.org/officeDocument/2006/math">
                         <m:oMathParaPr>
@@ -17904,7 +17929,7 @@
                 </p:txBody>
               </p:sp>
             </mc:Choice>
-            <mc:Fallback>
+            <mc:Fallback xmlns="">
               <p:sp>
                 <p:nvSpPr>
                   <p:cNvPr id="64" name="TextBox 63"/>
@@ -17944,8 +17969,8 @@
             </mc:Fallback>
           </mc:AlternateContent>
         </p:grpSp>
-        <mc:AlternateContent xmlns:mc="http://schemas.openxmlformats.org/markup-compatibility/2006">
-          <mc:Choice xmlns:a14="http://schemas.microsoft.com/office/drawing/2010/main" Requires="a14">
+        <mc:AlternateContent xmlns:mc="http://schemas.openxmlformats.org/markup-compatibility/2006" xmlns:a14="http://schemas.microsoft.com/office/drawing/2010/main">
+          <mc:Choice Requires="a14">
             <p:sp>
               <p:nvSpPr>
                 <p:cNvPr id="66" name="TextBox 65"/>
@@ -17968,6 +17993,7 @@
                 </a:bodyPr>
                 <a:lstStyle/>
                 <a:p>
+                  <a:pPr/>
                   <a14:m>
                     <m:oMathPara xmlns:m="http://schemas.openxmlformats.org/officeDocument/2006/math">
                       <m:oMathParaPr>
@@ -17992,7 +18018,7 @@
               </p:txBody>
             </p:sp>
           </mc:Choice>
-          <mc:Fallback>
+          <mc:Fallback xmlns="">
             <p:sp>
               <p:nvSpPr>
                 <p:cNvPr id="66" name="TextBox 65"/>

</xml_diff>

<commit_message>
Rough draft rolling motion question
</commit_message>
<xml_diff>
--- a/tex/figures/AngularMomentumRolling/Figures.pptx
+++ b/tex/figures/AngularMomentumRolling/Figures.pptx
@@ -10,6 +10,7 @@
     <p:sldId id="274" r:id="rId4"/>
     <p:sldId id="275" r:id="rId5"/>
     <p:sldId id="273" r:id="rId6"/>
+    <p:sldId id="276" r:id="rId7"/>
   </p:sldIdLst>
   <p:sldSz cx="12192000" cy="6858000"/>
   <p:notesSz cx="6858000" cy="9144000"/>
@@ -247,7 +248,7 @@
           <a:p>
             <a:fld id="{F7249F8D-641B-4CAF-BAE5-10524742F6F1}" type="datetimeFigureOut">
               <a:rPr lang="en-CA" smtClean="0"/>
-              <a:t>2018-07-12</a:t>
+              <a:t>2018-08-25</a:t>
             </a:fld>
             <a:endParaRPr lang="en-CA"/>
           </a:p>
@@ -417,7 +418,7 @@
           <a:p>
             <a:fld id="{F7249F8D-641B-4CAF-BAE5-10524742F6F1}" type="datetimeFigureOut">
               <a:rPr lang="en-CA" smtClean="0"/>
-              <a:t>2018-07-12</a:t>
+              <a:t>2018-08-25</a:t>
             </a:fld>
             <a:endParaRPr lang="en-CA"/>
           </a:p>
@@ -597,7 +598,7 @@
           <a:p>
             <a:fld id="{F7249F8D-641B-4CAF-BAE5-10524742F6F1}" type="datetimeFigureOut">
               <a:rPr lang="en-CA" smtClean="0"/>
-              <a:t>2018-07-12</a:t>
+              <a:t>2018-08-25</a:t>
             </a:fld>
             <a:endParaRPr lang="en-CA"/>
           </a:p>
@@ -767,7 +768,7 @@
           <a:p>
             <a:fld id="{F7249F8D-641B-4CAF-BAE5-10524742F6F1}" type="datetimeFigureOut">
               <a:rPr lang="en-CA" smtClean="0"/>
-              <a:t>2018-07-12</a:t>
+              <a:t>2018-08-25</a:t>
             </a:fld>
             <a:endParaRPr lang="en-CA"/>
           </a:p>
@@ -1013,7 +1014,7 @@
           <a:p>
             <a:fld id="{F7249F8D-641B-4CAF-BAE5-10524742F6F1}" type="datetimeFigureOut">
               <a:rPr lang="en-CA" smtClean="0"/>
-              <a:t>2018-07-12</a:t>
+              <a:t>2018-08-25</a:t>
             </a:fld>
             <a:endParaRPr lang="en-CA"/>
           </a:p>
@@ -1245,7 +1246,7 @@
           <a:p>
             <a:fld id="{F7249F8D-641B-4CAF-BAE5-10524742F6F1}" type="datetimeFigureOut">
               <a:rPr lang="en-CA" smtClean="0"/>
-              <a:t>2018-07-12</a:t>
+              <a:t>2018-08-25</a:t>
             </a:fld>
             <a:endParaRPr lang="en-CA"/>
           </a:p>
@@ -1612,7 +1613,7 @@
           <a:p>
             <a:fld id="{F7249F8D-641B-4CAF-BAE5-10524742F6F1}" type="datetimeFigureOut">
               <a:rPr lang="en-CA" smtClean="0"/>
-              <a:t>2018-07-12</a:t>
+              <a:t>2018-08-25</a:t>
             </a:fld>
             <a:endParaRPr lang="en-CA"/>
           </a:p>
@@ -1730,7 +1731,7 @@
           <a:p>
             <a:fld id="{F7249F8D-641B-4CAF-BAE5-10524742F6F1}" type="datetimeFigureOut">
               <a:rPr lang="en-CA" smtClean="0"/>
-              <a:t>2018-07-12</a:t>
+              <a:t>2018-08-25</a:t>
             </a:fld>
             <a:endParaRPr lang="en-CA"/>
           </a:p>
@@ -1825,7 +1826,7 @@
           <a:p>
             <a:fld id="{F7249F8D-641B-4CAF-BAE5-10524742F6F1}" type="datetimeFigureOut">
               <a:rPr lang="en-CA" smtClean="0"/>
-              <a:t>2018-07-12</a:t>
+              <a:t>2018-08-25</a:t>
             </a:fld>
             <a:endParaRPr lang="en-CA"/>
           </a:p>
@@ -2102,7 +2103,7 @@
           <a:p>
             <a:fld id="{F7249F8D-641B-4CAF-BAE5-10524742F6F1}" type="datetimeFigureOut">
               <a:rPr lang="en-CA" smtClean="0"/>
-              <a:t>2018-07-12</a:t>
+              <a:t>2018-08-25</a:t>
             </a:fld>
             <a:endParaRPr lang="en-CA"/>
           </a:p>
@@ -2355,7 +2356,7 @@
           <a:p>
             <a:fld id="{F7249F8D-641B-4CAF-BAE5-10524742F6F1}" type="datetimeFigureOut">
               <a:rPr lang="en-CA" smtClean="0"/>
-              <a:t>2018-07-12</a:t>
+              <a:t>2018-08-25</a:t>
             </a:fld>
             <a:endParaRPr lang="en-CA"/>
           </a:p>
@@ -2568,7 +2569,7 @@
           <a:p>
             <a:fld id="{F7249F8D-641B-4CAF-BAE5-10524742F6F1}" type="datetimeFigureOut">
               <a:rPr lang="en-CA" smtClean="0"/>
-              <a:t>2018-07-12</a:t>
+              <a:t>2018-08-25</a:t>
             </a:fld>
             <a:endParaRPr lang="en-CA"/>
           </a:p>
@@ -5732,7 +5733,7 @@
                             <m:chr m:val="⃗"/>
                             <m:ctrlPr>
                               <a:rPr lang="en-US" sz="2000" b="0" i="1" smtClean="0">
-                                <a:latin typeface="Cambria Math" panose="02040503050406030204" pitchFamily="18" charset="0"/>
+                                <a:latin typeface="Cambria Math" charset="0"/>
                                 <a:cs typeface="Arial" panose="020B0604020202020204" pitchFamily="34" charset="0"/>
                               </a:rPr>
                             </m:ctrlPr>
@@ -5869,7 +5870,7 @@
                             <m:chr m:val="⃗"/>
                             <m:ctrlPr>
                               <a:rPr lang="en-US" sz="2000" b="0" i="1" smtClean="0">
-                                <a:latin typeface="Cambria Math" panose="02040503050406030204" pitchFamily="18" charset="0"/>
+                                <a:latin typeface="Cambria Math" charset="0"/>
                                 <a:cs typeface="Arial" panose="020B0604020202020204" pitchFamily="34" charset="0"/>
                               </a:rPr>
                             </m:ctrlPr>
@@ -6065,7 +6066,7 @@
                                 <a:solidFill>
                                   <a:srgbClr val="FF0000"/>
                                 </a:solidFill>
-                                <a:latin typeface="Cambria Math" panose="02040503050406030204" pitchFamily="18" charset="0"/>
+                                <a:latin typeface="Cambria Math" charset="0"/>
                                 <a:cs typeface="Arial" panose="020B0604020202020204" pitchFamily="34" charset="0"/>
                               </a:rPr>
                             </m:ctrlPr>
@@ -6685,7 +6686,7 @@
                             <m:chr m:val="⃗"/>
                             <m:ctrlPr>
                               <a:rPr lang="en-US" sz="2000" b="0" i="1" smtClean="0">
-                                <a:latin typeface="Cambria Math" panose="02040503050406030204" pitchFamily="18" charset="0"/>
+                                <a:latin typeface="Cambria Math" charset="0"/>
                                 <a:cs typeface="Arial" panose="020B0604020202020204" pitchFamily="34" charset="0"/>
                               </a:rPr>
                             </m:ctrlPr>
@@ -6912,7 +6913,7 @@
                             <m:chr m:val="⃗"/>
                             <m:ctrlPr>
                               <a:rPr lang="en-US" sz="2000" b="0" i="1" smtClean="0">
-                                <a:latin typeface="Cambria Math" panose="02040503050406030204" pitchFamily="18" charset="0"/>
+                                <a:latin typeface="Cambria Math" charset="0"/>
                                 <a:cs typeface="Arial" panose="020B0604020202020204" pitchFamily="34" charset="0"/>
                               </a:rPr>
                             </m:ctrlPr>
@@ -7862,7 +7863,7 @@
                               <m:sSubPr>
                                 <m:ctrlPr>
                                   <a:rPr lang="en-US" sz="2000" b="0" i="1" smtClean="0">
-                                    <a:latin typeface="Cambria Math" panose="02040503050406030204" pitchFamily="18" charset="0"/>
+                                    <a:latin typeface="Cambria Math" charset="0"/>
                                     <a:cs typeface="Arial" panose="020B0604020202020204" pitchFamily="34" charset="0"/>
                                   </a:rPr>
                                 </m:ctrlPr>
@@ -8009,7 +8010,7 @@
                               <m:sSubPr>
                                 <m:ctrlPr>
                                   <a:rPr lang="en-US" sz="2000" b="0" i="1" smtClean="0">
-                                    <a:latin typeface="Cambria Math" panose="02040503050406030204" pitchFamily="18" charset="0"/>
+                                    <a:latin typeface="Cambria Math" charset="0"/>
                                     <a:cs typeface="Arial" panose="020B0604020202020204" pitchFamily="34" charset="0"/>
                                   </a:rPr>
                                 </m:ctrlPr>
@@ -8020,7 +8021,7 @@
                                     <m:chr m:val="⃗"/>
                                     <m:ctrlPr>
                                       <a:rPr lang="en-US" sz="2000" b="0" i="1" smtClean="0">
-                                        <a:latin typeface="Cambria Math" panose="02040503050406030204" pitchFamily="18" charset="0"/>
+                                        <a:latin typeface="Cambria Math" charset="0"/>
                                         <a:cs typeface="Arial" panose="020B0604020202020204" pitchFamily="34" charset="0"/>
                                       </a:rPr>
                                     </m:ctrlPr>
@@ -8167,7 +8168,7 @@
                               <m:sSubPr>
                                 <m:ctrlPr>
                                   <a:rPr lang="en-US" sz="2000" b="0" i="1" smtClean="0">
-                                    <a:latin typeface="Cambria Math" panose="02040503050406030204" pitchFamily="18" charset="0"/>
+                                    <a:latin typeface="Cambria Math" charset="0"/>
                                     <a:cs typeface="Arial" panose="020B0604020202020204" pitchFamily="34" charset="0"/>
                                   </a:rPr>
                                 </m:ctrlPr>
@@ -8178,7 +8179,7 @@
                                     <m:chr m:val="⃗"/>
                                     <m:ctrlPr>
                                       <a:rPr lang="en-US" sz="2000" b="0" i="1" smtClean="0">
-                                        <a:latin typeface="Cambria Math" panose="02040503050406030204" pitchFamily="18" charset="0"/>
+                                        <a:latin typeface="Cambria Math" charset="0"/>
                                         <a:cs typeface="Arial" panose="020B0604020202020204" pitchFamily="34" charset="0"/>
                                       </a:rPr>
                                     </m:ctrlPr>
@@ -8463,7 +8464,7 @@
                               <m:chr m:val="⃗"/>
                               <m:ctrlPr>
                                 <a:rPr lang="en-US" sz="2000" b="0" i="1" smtClean="0">
-                                  <a:latin typeface="Cambria Math" panose="02040503050406030204" pitchFamily="18" charset="0"/>
+                                  <a:latin typeface="Cambria Math" charset="0"/>
                                   <a:cs typeface="Arial" panose="020B0604020202020204" pitchFamily="34" charset="0"/>
                                 </a:rPr>
                               </m:ctrlPr>
@@ -9851,7 +9852,7 @@
                                   <m:chr m:val="⃗"/>
                                   <m:ctrlPr>
                                     <a:rPr lang="en-US" sz="2000" b="0" i="1" smtClean="0">
-                                      <a:latin typeface="Cambria Math" panose="02040503050406030204" pitchFamily="18" charset="0"/>
+                                      <a:latin typeface="Cambria Math" charset="0"/>
                                       <a:cs typeface="Arial" panose="020B0604020202020204" pitchFamily="34" charset="0"/>
                                     </a:rPr>
                                   </m:ctrlPr>
@@ -10177,7 +10178,7 @@
                             <m:sSubPr>
                               <m:ctrlPr>
                                 <a:rPr lang="en-US" sz="2000" b="0" i="1" smtClean="0">
-                                  <a:latin typeface="Cambria Math" panose="02040503050406030204" pitchFamily="18" charset="0"/>
+                                  <a:latin typeface="Cambria Math" charset="0"/>
                                   <a:cs typeface="Arial" panose="020B0604020202020204" pitchFamily="34" charset="0"/>
                                 </a:rPr>
                               </m:ctrlPr>
@@ -10348,7 +10349,7 @@
                             <m:chr m:val="⃗"/>
                             <m:ctrlPr>
                               <a:rPr lang="en-US" sz="2000" b="0" i="1" smtClean="0">
-                                <a:latin typeface="Cambria Math" panose="02040503050406030204" pitchFamily="18" charset="0"/>
+                                <a:latin typeface="Cambria Math" charset="0"/>
                                 <a:cs typeface="Arial" panose="020B0604020202020204" pitchFamily="34" charset="0"/>
                               </a:rPr>
                             </m:ctrlPr>
@@ -12041,7 +12042,7 @@
                               <m:sSubPr>
                                 <m:ctrlPr>
                                   <a:rPr lang="en-US" sz="2000" b="0" i="1" smtClean="0">
-                                    <a:latin typeface="Cambria Math" panose="02040503050406030204" pitchFamily="18" charset="0"/>
+                                    <a:latin typeface="Cambria Math" charset="0"/>
                                     <a:cs typeface="Arial" panose="020B0604020202020204" pitchFamily="34" charset="0"/>
                                   </a:rPr>
                                 </m:ctrlPr>
@@ -12052,7 +12053,7 @@
                                     <m:chr m:val="⃗"/>
                                     <m:ctrlPr>
                                       <a:rPr lang="en-US" sz="2000" b="0" i="1" smtClean="0">
-                                        <a:latin typeface="Cambria Math" panose="02040503050406030204" pitchFamily="18" charset="0"/>
+                                        <a:latin typeface="Cambria Math" charset="0"/>
                                         <a:cs typeface="Arial" panose="020B0604020202020204" pitchFamily="34" charset="0"/>
                                       </a:rPr>
                                     </m:ctrlPr>
@@ -12170,7 +12171,7 @@
                               <m:sSubPr>
                                 <m:ctrlPr>
                                   <a:rPr lang="en-US" sz="2000" b="0" i="1" smtClean="0">
-                                    <a:latin typeface="Cambria Math" panose="02040503050406030204" pitchFamily="18" charset="0"/>
+                                    <a:latin typeface="Cambria Math" charset="0"/>
                                     <a:cs typeface="Arial" panose="020B0604020202020204" pitchFamily="34" charset="0"/>
                                   </a:rPr>
                                 </m:ctrlPr>
@@ -12181,7 +12182,7 @@
                                     <m:chr m:val="⃗"/>
                                     <m:ctrlPr>
                                       <a:rPr lang="en-US" sz="2000" b="0" i="1" smtClean="0">
-                                        <a:latin typeface="Cambria Math" panose="02040503050406030204" pitchFamily="18" charset="0"/>
+                                        <a:latin typeface="Cambria Math" charset="0"/>
                                         <a:cs typeface="Arial" panose="020B0604020202020204" pitchFamily="34" charset="0"/>
                                       </a:rPr>
                                     </m:ctrlPr>
@@ -12299,7 +12300,7 @@
                               <m:sSubPr>
                                 <m:ctrlPr>
                                   <a:rPr lang="en-US" sz="2000" b="0" i="1" smtClean="0">
-                                    <a:latin typeface="Cambria Math" panose="02040503050406030204" pitchFamily="18" charset="0"/>
+                                    <a:latin typeface="Cambria Math" charset="0"/>
                                     <a:cs typeface="Arial" panose="020B0604020202020204" pitchFamily="34" charset="0"/>
                                   </a:rPr>
                                 </m:ctrlPr>
@@ -12310,7 +12311,7 @@
                                     <m:chr m:val="⃗"/>
                                     <m:ctrlPr>
                                       <a:rPr lang="en-US" sz="2000" b="0" i="1" smtClean="0">
-                                        <a:latin typeface="Cambria Math" panose="02040503050406030204" pitchFamily="18" charset="0"/>
+                                        <a:latin typeface="Cambria Math" charset="0"/>
                                         <a:cs typeface="Arial" panose="020B0604020202020204" pitchFamily="34" charset="0"/>
                                       </a:rPr>
                                     </m:ctrlPr>
@@ -12428,7 +12429,7 @@
                               <m:sSubPr>
                                 <m:ctrlPr>
                                   <a:rPr lang="en-US" sz="2000" b="0" i="1" smtClean="0">
-                                    <a:latin typeface="Cambria Math" panose="02040503050406030204" pitchFamily="18" charset="0"/>
+                                    <a:latin typeface="Cambria Math" charset="0"/>
                                     <a:cs typeface="Arial" panose="020B0604020202020204" pitchFamily="34" charset="0"/>
                                   </a:rPr>
                                 </m:ctrlPr>
@@ -12439,7 +12440,7 @@
                                     <m:chr m:val="⃗"/>
                                     <m:ctrlPr>
                                       <a:rPr lang="en-US" sz="2000" b="0" i="1" smtClean="0">
-                                        <a:latin typeface="Cambria Math" panose="02040503050406030204" pitchFamily="18" charset="0"/>
+                                        <a:latin typeface="Cambria Math" charset="0"/>
                                         <a:cs typeface="Arial" panose="020B0604020202020204" pitchFamily="34" charset="0"/>
                                       </a:rPr>
                                     </m:ctrlPr>
@@ -12557,7 +12558,7 @@
                               <m:sSubPr>
                                 <m:ctrlPr>
                                   <a:rPr lang="en-US" sz="2000" b="0" i="1" smtClean="0">
-                                    <a:latin typeface="Cambria Math" panose="02040503050406030204" pitchFamily="18" charset="0"/>
+                                    <a:latin typeface="Cambria Math" charset="0"/>
                                     <a:cs typeface="Arial" panose="020B0604020202020204" pitchFamily="34" charset="0"/>
                                   </a:rPr>
                                 </m:ctrlPr>
@@ -12568,7 +12569,7 @@
                                     <m:chr m:val="⃗"/>
                                     <m:ctrlPr>
                                       <a:rPr lang="en-US" sz="2000" b="0" i="1" smtClean="0">
-                                        <a:latin typeface="Cambria Math" panose="02040503050406030204" pitchFamily="18" charset="0"/>
+                                        <a:latin typeface="Cambria Math" charset="0"/>
                                         <a:cs typeface="Arial" panose="020B0604020202020204" pitchFamily="34" charset="0"/>
                                       </a:rPr>
                                     </m:ctrlPr>
@@ -13499,7 +13500,7 @@
                           <m:sSubPr>
                             <m:ctrlPr>
                               <a:rPr lang="en-US" sz="2000" b="0" i="1" smtClean="0">
-                                <a:latin typeface="Cambria Math" panose="02040503050406030204" pitchFamily="18" charset="0"/>
+                                <a:latin typeface="Cambria Math" charset="0"/>
                                 <a:cs typeface="Arial" panose="020B0604020202020204" pitchFamily="34" charset="0"/>
                               </a:rPr>
                             </m:ctrlPr>
@@ -13510,7 +13511,7 @@
                                 <m:chr m:val="⃗"/>
                                 <m:ctrlPr>
                                   <a:rPr lang="en-US" sz="2000" b="0" i="1" smtClean="0">
-                                    <a:latin typeface="Cambria Math" panose="02040503050406030204" pitchFamily="18" charset="0"/>
+                                    <a:latin typeface="Cambria Math" charset="0"/>
                                     <a:cs typeface="Arial" panose="020B0604020202020204" pitchFamily="34" charset="0"/>
                                   </a:rPr>
                                 </m:ctrlPr>
@@ -13628,7 +13629,7 @@
                           <m:sSubPr>
                             <m:ctrlPr>
                               <a:rPr lang="en-US" sz="2000" b="0" i="1" smtClean="0">
-                                <a:latin typeface="Cambria Math" panose="02040503050406030204" pitchFamily="18" charset="0"/>
+                                <a:latin typeface="Cambria Math" charset="0"/>
                                 <a:cs typeface="Arial" panose="020B0604020202020204" pitchFamily="34" charset="0"/>
                               </a:rPr>
                             </m:ctrlPr>
@@ -13639,7 +13640,7 @@
                                 <m:chr m:val="⃗"/>
                                 <m:ctrlPr>
                                   <a:rPr lang="en-US" sz="2000" b="0" i="1" smtClean="0">
-                                    <a:latin typeface="Cambria Math" panose="02040503050406030204" pitchFamily="18" charset="0"/>
+                                    <a:latin typeface="Cambria Math" charset="0"/>
                                     <a:cs typeface="Arial" panose="020B0604020202020204" pitchFamily="34" charset="0"/>
                                   </a:rPr>
                                 </m:ctrlPr>
@@ -13757,7 +13758,7 @@
                           <m:sSubPr>
                             <m:ctrlPr>
                               <a:rPr lang="en-US" sz="2000" b="0" i="1" smtClean="0">
-                                <a:latin typeface="Cambria Math" panose="02040503050406030204" pitchFamily="18" charset="0"/>
+                                <a:latin typeface="Cambria Math" charset="0"/>
                                 <a:cs typeface="Arial" panose="020B0604020202020204" pitchFamily="34" charset="0"/>
                               </a:rPr>
                             </m:ctrlPr>
@@ -13768,7 +13769,7 @@
                                 <m:chr m:val="⃗"/>
                                 <m:ctrlPr>
                                   <a:rPr lang="en-US" sz="2000" b="0" i="1" smtClean="0">
-                                    <a:latin typeface="Cambria Math" panose="02040503050406030204" pitchFamily="18" charset="0"/>
+                                    <a:latin typeface="Cambria Math" charset="0"/>
                                     <a:cs typeface="Arial" panose="020B0604020202020204" pitchFamily="34" charset="0"/>
                                   </a:rPr>
                                 </m:ctrlPr>
@@ -13886,7 +13887,7 @@
                           <m:sSubPr>
                             <m:ctrlPr>
                               <a:rPr lang="en-US" sz="2000" b="0" i="1" smtClean="0">
-                                <a:latin typeface="Cambria Math" panose="02040503050406030204" pitchFamily="18" charset="0"/>
+                                <a:latin typeface="Cambria Math" charset="0"/>
                                 <a:cs typeface="Arial" panose="020B0604020202020204" pitchFamily="34" charset="0"/>
                               </a:rPr>
                             </m:ctrlPr>
@@ -13897,7 +13898,7 @@
                                 <m:chr m:val="⃗"/>
                                 <m:ctrlPr>
                                   <a:rPr lang="en-US" sz="2000" b="0" i="1" smtClean="0">
-                                    <a:latin typeface="Cambria Math" panose="02040503050406030204" pitchFamily="18" charset="0"/>
+                                    <a:latin typeface="Cambria Math" charset="0"/>
                                     <a:cs typeface="Arial" panose="020B0604020202020204" pitchFamily="34" charset="0"/>
                                   </a:rPr>
                                 </m:ctrlPr>
@@ -14015,7 +14016,7 @@
                           <m:sSubPr>
                             <m:ctrlPr>
                               <a:rPr lang="en-US" sz="2000" b="0" i="1" smtClean="0">
-                                <a:latin typeface="Cambria Math" panose="02040503050406030204" pitchFamily="18" charset="0"/>
+                                <a:latin typeface="Cambria Math" charset="0"/>
                                 <a:cs typeface="Arial" panose="020B0604020202020204" pitchFamily="34" charset="0"/>
                               </a:rPr>
                             </m:ctrlPr>
@@ -14026,7 +14027,7 @@
                                 <m:chr m:val="⃗"/>
                                 <m:ctrlPr>
                                   <a:rPr lang="en-US" sz="2000" b="0" i="1" smtClean="0">
-                                    <a:latin typeface="Cambria Math" panose="02040503050406030204" pitchFamily="18" charset="0"/>
+                                    <a:latin typeface="Cambria Math" charset="0"/>
                                     <a:cs typeface="Arial" panose="020B0604020202020204" pitchFamily="34" charset="0"/>
                                   </a:rPr>
                                 </m:ctrlPr>
@@ -14793,7 +14794,7 @@
                               <m:chr m:val="⃗"/>
                               <m:ctrlPr>
                                 <a:rPr lang="en-US" sz="2000" b="0" i="1" smtClean="0">
-                                  <a:latin typeface="Cambria Math" panose="02040503050406030204" pitchFamily="18" charset="0"/>
+                                  <a:latin typeface="Cambria Math" charset="0"/>
                                   <a:cs typeface="Arial" panose="020B0604020202020204" pitchFamily="34" charset="0"/>
                                 </a:rPr>
                               </m:ctrlPr>
@@ -15007,7 +15008,7 @@
                             <m:sSubPr>
                               <m:ctrlPr>
                                 <a:rPr lang="en-US" sz="2000" b="0" i="1" smtClean="0">
-                                  <a:latin typeface="Cambria Math" panose="02040503050406030204" pitchFamily="18" charset="0"/>
+                                  <a:latin typeface="Cambria Math" charset="0"/>
                                   <a:cs typeface="Arial" panose="020B0604020202020204" pitchFamily="34" charset="0"/>
                                 </a:rPr>
                               </m:ctrlPr>
@@ -15018,7 +15019,7 @@
                                   <m:chr m:val="⃗"/>
                                   <m:ctrlPr>
                                     <a:rPr lang="en-US" sz="2000" b="0" i="1" smtClean="0">
-                                      <a:latin typeface="Cambria Math" panose="02040503050406030204" pitchFamily="18" charset="0"/>
+                                      <a:latin typeface="Cambria Math" charset="0"/>
                                       <a:cs typeface="Arial" panose="020B0604020202020204" pitchFamily="34" charset="0"/>
                                     </a:rPr>
                                   </m:ctrlPr>
@@ -15176,7 +15177,7 @@
                               <m:chr m:val="⃗"/>
                               <m:ctrlPr>
                                 <a:rPr lang="en-US" sz="2000" b="0" i="1" smtClean="0">
-                                  <a:latin typeface="Cambria Math" panose="02040503050406030204" pitchFamily="18" charset="0"/>
+                                  <a:latin typeface="Cambria Math" charset="0"/>
                                   <a:cs typeface="Arial" panose="020B0604020202020204" pitchFamily="34" charset="0"/>
                                 </a:rPr>
                               </m:ctrlPr>
@@ -15315,7 +15316,7 @@
                           <m:sSubPr>
                             <m:ctrlPr>
                               <a:rPr lang="en-US" sz="2000" b="0" i="1" smtClean="0">
-                                <a:latin typeface="Cambria Math" panose="02040503050406030204" pitchFamily="18" charset="0"/>
+                                <a:latin typeface="Cambria Math" charset="0"/>
                                 <a:cs typeface="Arial" panose="020B0604020202020204" pitchFamily="34" charset="0"/>
                               </a:rPr>
                             </m:ctrlPr>
@@ -15326,7 +15327,7 @@
                                 <m:chr m:val="⃗"/>
                                 <m:ctrlPr>
                                   <a:rPr lang="en-US" sz="2000" b="0" i="1" smtClean="0">
-                                    <a:latin typeface="Cambria Math" panose="02040503050406030204" pitchFamily="18" charset="0"/>
+                                    <a:latin typeface="Cambria Math" charset="0"/>
                                     <a:cs typeface="Arial" panose="020B0604020202020204" pitchFamily="34" charset="0"/>
                                   </a:rPr>
                                 </m:ctrlPr>
@@ -16647,7 +16648,7 @@
                                     <m:chr m:val="⃗"/>
                                     <m:ctrlPr>
                                       <a:rPr lang="en-US" sz="2000" b="0" i="1" smtClean="0">
-                                        <a:latin typeface="Cambria Math" panose="02040503050406030204" pitchFamily="18" charset="0"/>
+                                        <a:latin typeface="Cambria Math" charset="0"/>
                                         <a:cs typeface="Arial" panose="020B0604020202020204" pitchFamily="34" charset="0"/>
                                       </a:rPr>
                                     </m:ctrlPr>
@@ -16747,7 +16748,7 @@
                                   <m:sSubPr>
                                     <m:ctrlPr>
                                       <a:rPr lang="en-US" sz="2000" b="0" i="1" smtClean="0">
-                                        <a:latin typeface="Cambria Math" panose="02040503050406030204" pitchFamily="18" charset="0"/>
+                                        <a:latin typeface="Cambria Math" charset="0"/>
                                         <a:cs typeface="Arial" panose="020B0604020202020204" pitchFamily="34" charset="0"/>
                                       </a:rPr>
                                     </m:ctrlPr>
@@ -16758,7 +16759,7 @@
                                         <m:chr m:val="⃗"/>
                                         <m:ctrlPr>
                                           <a:rPr lang="en-US" sz="2000" b="0" i="1" smtClean="0">
-                                            <a:latin typeface="Cambria Math" panose="02040503050406030204" pitchFamily="18" charset="0"/>
+                                            <a:latin typeface="Cambria Math" charset="0"/>
                                             <a:cs typeface="Arial" panose="020B0604020202020204" pitchFamily="34" charset="0"/>
                                           </a:rPr>
                                         </m:ctrlPr>
@@ -16905,7 +16906,7 @@
                                   <m:sSubPr>
                                     <m:ctrlPr>
                                       <a:rPr lang="en-US" sz="2000" b="0" i="1" smtClean="0">
-                                        <a:latin typeface="Cambria Math" panose="02040503050406030204" pitchFamily="18" charset="0"/>
+                                        <a:latin typeface="Cambria Math" charset="0"/>
                                         <a:cs typeface="Arial" panose="020B0604020202020204" pitchFamily="34" charset="0"/>
                                       </a:rPr>
                                     </m:ctrlPr>
@@ -16916,7 +16917,7 @@
                                         <m:chr m:val="⃗"/>
                                         <m:ctrlPr>
                                           <a:rPr lang="en-US" sz="2000" b="0" i="1" smtClean="0">
-                                            <a:latin typeface="Cambria Math" panose="02040503050406030204" pitchFamily="18" charset="0"/>
+                                            <a:latin typeface="Cambria Math" charset="0"/>
                                             <a:cs typeface="Arial" panose="020B0604020202020204" pitchFamily="34" charset="0"/>
                                           </a:rPr>
                                         </m:ctrlPr>
@@ -17288,7 +17289,7 @@
                               <m:sSubPr>
                                 <m:ctrlPr>
                                   <a:rPr lang="en-US" sz="2000" b="0" i="1" smtClean="0">
-                                    <a:latin typeface="Cambria Math" panose="02040503050406030204" pitchFamily="18" charset="0"/>
+                                    <a:latin typeface="Cambria Math" charset="0"/>
                                     <a:cs typeface="Arial" panose="020B0604020202020204" pitchFamily="34" charset="0"/>
                                   </a:rPr>
                                 </m:ctrlPr>
@@ -17299,7 +17300,7 @@
                                     <m:chr m:val="⃗"/>
                                     <m:ctrlPr>
                                       <a:rPr lang="en-US" sz="2000" b="0" i="1" smtClean="0">
-                                        <a:latin typeface="Cambria Math" panose="02040503050406030204" pitchFamily="18" charset="0"/>
+                                        <a:latin typeface="Cambria Math" charset="0"/>
                                         <a:cs typeface="Arial" panose="020B0604020202020204" pitchFamily="34" charset="0"/>
                                       </a:rPr>
                                     </m:ctrlPr>
@@ -17903,7 +17904,7 @@
                               <m:chr m:val="⃗"/>
                               <m:ctrlPr>
                                 <a:rPr lang="en-US" sz="2000" b="0" i="1" smtClean="0">
-                                  <a:latin typeface="Cambria Math" panose="02040503050406030204" pitchFamily="18" charset="0"/>
+                                  <a:latin typeface="Cambria Math" charset="0"/>
                                   <a:cs typeface="Arial" panose="020B0604020202020204" pitchFamily="34" charset="0"/>
                                 </a:rPr>
                               </m:ctrlPr>
@@ -18284,7 +18285,7 @@
                               <m:chr m:val="⃗"/>
                               <m:ctrlPr>
                                 <a:rPr lang="en-US" sz="2000" b="0" i="1" smtClean="0">
-                                  <a:latin typeface="Cambria Math" panose="02040503050406030204" pitchFamily="18" charset="0"/>
+                                  <a:latin typeface="Cambria Math" charset="0"/>
                                   <a:cs typeface="Arial" panose="020B0604020202020204" pitchFamily="34" charset="0"/>
                                 </a:rPr>
                               </m:ctrlPr>
@@ -19396,7 +19397,7 @@
                             <m:chr m:val="⃗"/>
                             <m:ctrlPr>
                               <a:rPr lang="en-US" sz="2000" b="0" i="1" smtClean="0">
-                                <a:latin typeface="Cambria Math" panose="02040503050406030204" pitchFamily="18" charset="0"/>
+                                <a:latin typeface="Cambria Math" charset="0"/>
                                 <a:cs typeface="Arial" panose="020B0604020202020204" pitchFamily="34" charset="0"/>
                               </a:rPr>
                             </m:ctrlPr>
@@ -19585,7 +19586,7 @@
                             <m:chr m:val="⃗"/>
                             <m:ctrlPr>
                               <a:rPr lang="en-US" sz="2000" b="0" i="1" smtClean="0">
-                                <a:latin typeface="Cambria Math" panose="02040503050406030204" pitchFamily="18" charset="0"/>
+                                <a:latin typeface="Cambria Math" charset="0"/>
                                 <a:cs typeface="Arial" panose="020B0604020202020204" pitchFamily="34" charset="0"/>
                               </a:rPr>
                             </m:ctrlPr>
@@ -20670,7 +20671,7 @@
                                 <m:chr m:val="⃗"/>
                                 <m:ctrlPr>
                                   <a:rPr lang="en-US" sz="2000" b="0" i="1" smtClean="0">
-                                    <a:latin typeface="Cambria Math" panose="02040503050406030204" pitchFamily="18" charset="0"/>
+                                    <a:latin typeface="Cambria Math" charset="0"/>
                                     <a:cs typeface="Arial" panose="020B0604020202020204" pitchFamily="34" charset="0"/>
                                   </a:rPr>
                                 </m:ctrlPr>
@@ -20771,7 +20772,7 @@
                                 <m:chr m:val="⃗"/>
                                 <m:ctrlPr>
                                   <a:rPr lang="en-US" sz="2000" b="0" i="1" smtClean="0">
-                                    <a:latin typeface="Cambria Math" panose="02040503050406030204" pitchFamily="18" charset="0"/>
+                                    <a:latin typeface="Cambria Math" charset="0"/>
                                     <a:cs typeface="Arial" panose="020B0604020202020204" pitchFamily="34" charset="0"/>
                                   </a:rPr>
                                 </m:ctrlPr>
@@ -21449,7 +21450,7 @@
                                 <m:chr m:val="⃗"/>
                                 <m:ctrlPr>
                                   <a:rPr lang="en-US" sz="2000" b="0" i="1" smtClean="0">
-                                    <a:latin typeface="Cambria Math" panose="02040503050406030204" pitchFamily="18" charset="0"/>
+                                    <a:latin typeface="Cambria Math" charset="0"/>
                                     <a:cs typeface="Arial" panose="020B0604020202020204" pitchFamily="34" charset="0"/>
                                   </a:rPr>
                                 </m:ctrlPr>
@@ -22013,7 +22014,7 @@
                               <m:chr m:val="⃗"/>
                               <m:ctrlPr>
                                 <a:rPr lang="en-US" sz="2000" b="0" i="1" smtClean="0">
-                                  <a:latin typeface="Cambria Math" panose="02040503050406030204" pitchFamily="18" charset="0"/>
+                                  <a:latin typeface="Cambria Math" charset="0"/>
                                   <a:cs typeface="Arial" panose="020B0604020202020204" pitchFamily="34" charset="0"/>
                                 </a:rPr>
                               </m:ctrlPr>
@@ -22172,6 +22173,1367 @@
     <p:extLst>
       <p:ext uri="{BB962C8B-B14F-4D97-AF65-F5344CB8AC3E}">
         <p14:creationId xmlns:p14="http://schemas.microsoft.com/office/powerpoint/2010/main" val="1518829247"/>
+      </p:ext>
+    </p:extLst>
+  </p:cSld>
+  <p:clrMapOvr>
+    <a:masterClrMapping/>
+  </p:clrMapOvr>
+</p:sld>
+</file>
+
+<file path=ppt/slides/slide6.xml><?xml version="1.0" encoding="utf-8"?>
+<p:sld xmlns:a="http://schemas.openxmlformats.org/drawingml/2006/main" xmlns:r="http://schemas.openxmlformats.org/officeDocument/2006/relationships" xmlns:p="http://schemas.openxmlformats.org/presentationml/2006/main">
+  <p:cSld>
+    <p:spTree>
+      <p:nvGrpSpPr>
+        <p:cNvPr id="1" name=""/>
+        <p:cNvGrpSpPr/>
+        <p:nvPr/>
+      </p:nvGrpSpPr>
+      <p:grpSpPr>
+        <a:xfrm>
+          <a:off x="0" y="0"/>
+          <a:ext cx="0" cy="0"/>
+          <a:chOff x="0" y="0"/>
+          <a:chExt cx="0" cy="0"/>
+        </a:xfrm>
+      </p:grpSpPr>
+      <p:grpSp>
+        <p:nvGrpSpPr>
+          <p:cNvPr id="4" name="Group 3"/>
+          <p:cNvGrpSpPr/>
+          <p:nvPr/>
+        </p:nvGrpSpPr>
+        <p:grpSpPr>
+          <a:xfrm>
+            <a:off x="776543" y="421757"/>
+            <a:ext cx="5494317" cy="3256265"/>
+            <a:chOff x="776543" y="421757"/>
+            <a:chExt cx="5494317" cy="3256265"/>
+          </a:xfrm>
+        </p:grpSpPr>
+        <p:grpSp>
+          <p:nvGrpSpPr>
+            <p:cNvPr id="5" name="Group 4"/>
+            <p:cNvGrpSpPr/>
+            <p:nvPr/>
+          </p:nvGrpSpPr>
+          <p:grpSpPr>
+            <a:xfrm>
+              <a:off x="776543" y="421757"/>
+              <a:ext cx="2041595" cy="3256265"/>
+              <a:chOff x="343786" y="393406"/>
+              <a:chExt cx="2041595" cy="3256265"/>
+            </a:xfrm>
+            <a:solidFill>
+              <a:schemeClr val="bg1"/>
+            </a:solidFill>
+          </p:grpSpPr>
+          <p:sp>
+            <p:nvSpPr>
+              <p:cNvPr id="15" name="Oval 14"/>
+              <p:cNvSpPr/>
+              <p:nvPr/>
+            </p:nvSpPr>
+            <p:spPr>
+              <a:xfrm>
+                <a:off x="343786" y="1520081"/>
+                <a:ext cx="1311442" cy="2129589"/>
+              </a:xfrm>
+              <a:prstGeom prst="ellipse">
+                <a:avLst/>
+              </a:prstGeom>
+              <a:grpFill/>
+              <a:ln w="38100">
+                <a:solidFill>
+                  <a:schemeClr val="tx1"/>
+                </a:solidFill>
+              </a:ln>
+            </p:spPr>
+            <p:style>
+              <a:lnRef idx="2">
+                <a:schemeClr val="accent1">
+                  <a:shade val="50000"/>
+                </a:schemeClr>
+              </a:lnRef>
+              <a:fillRef idx="1">
+                <a:schemeClr val="accent1"/>
+              </a:fillRef>
+              <a:effectRef idx="0">
+                <a:schemeClr val="accent1"/>
+              </a:effectRef>
+              <a:fontRef idx="minor">
+                <a:schemeClr val="lt1"/>
+              </a:fontRef>
+            </p:style>
+            <p:txBody>
+              <a:bodyPr rtlCol="0" anchor="ctr"/>
+              <a:lstStyle/>
+              <a:p>
+                <a:pPr algn="ctr"/>
+                <a:endParaRPr lang="en-US"/>
+              </a:p>
+            </p:txBody>
+          </p:sp>
+          <p:sp>
+            <p:nvSpPr>
+              <p:cNvPr id="16" name="Oval 15"/>
+              <p:cNvSpPr/>
+              <p:nvPr/>
+            </p:nvSpPr>
+            <p:spPr>
+              <a:xfrm>
+                <a:off x="472123" y="1520081"/>
+                <a:ext cx="1311442" cy="2129589"/>
+              </a:xfrm>
+              <a:prstGeom prst="ellipse">
+                <a:avLst/>
+              </a:prstGeom>
+              <a:grpFill/>
+              <a:ln w="38100">
+                <a:solidFill>
+                  <a:schemeClr val="tx1"/>
+                </a:solidFill>
+              </a:ln>
+            </p:spPr>
+            <p:style>
+              <a:lnRef idx="2">
+                <a:schemeClr val="accent1">
+                  <a:shade val="50000"/>
+                </a:schemeClr>
+              </a:lnRef>
+              <a:fillRef idx="1">
+                <a:schemeClr val="accent1"/>
+              </a:fillRef>
+              <a:effectRef idx="0">
+                <a:schemeClr val="accent1"/>
+              </a:effectRef>
+              <a:fontRef idx="minor">
+                <a:schemeClr val="lt1"/>
+              </a:fontRef>
+            </p:style>
+            <p:txBody>
+              <a:bodyPr rtlCol="0" anchor="ctr"/>
+              <a:lstStyle/>
+              <a:p>
+                <a:pPr algn="ctr"/>
+                <a:endParaRPr lang="en-US"/>
+              </a:p>
+            </p:txBody>
+          </p:sp>
+          <p:sp>
+            <p:nvSpPr>
+              <p:cNvPr id="17" name="Oval 16"/>
+              <p:cNvSpPr/>
+              <p:nvPr/>
+            </p:nvSpPr>
+            <p:spPr>
+              <a:xfrm>
+                <a:off x="714993" y="1938482"/>
+                <a:ext cx="682349" cy="1177043"/>
+              </a:xfrm>
+              <a:prstGeom prst="ellipse">
+                <a:avLst/>
+              </a:prstGeom>
+              <a:grpFill/>
+              <a:ln w="38100">
+                <a:solidFill>
+                  <a:schemeClr val="tx1"/>
+                </a:solidFill>
+              </a:ln>
+            </p:spPr>
+            <p:style>
+              <a:lnRef idx="2">
+                <a:schemeClr val="accent1">
+                  <a:shade val="50000"/>
+                </a:schemeClr>
+              </a:lnRef>
+              <a:fillRef idx="1">
+                <a:schemeClr val="accent1"/>
+              </a:fillRef>
+              <a:effectRef idx="0">
+                <a:schemeClr val="accent1"/>
+              </a:effectRef>
+              <a:fontRef idx="minor">
+                <a:schemeClr val="lt1"/>
+              </a:fontRef>
+            </p:style>
+            <p:txBody>
+              <a:bodyPr rtlCol="0" anchor="ctr"/>
+              <a:lstStyle/>
+              <a:p>
+                <a:pPr algn="ctr"/>
+                <a:endParaRPr lang="en-US"/>
+              </a:p>
+            </p:txBody>
+          </p:sp>
+          <p:sp>
+            <p:nvSpPr>
+              <p:cNvPr id="18" name="Oval 17"/>
+              <p:cNvSpPr/>
+              <p:nvPr/>
+            </p:nvSpPr>
+            <p:spPr>
+              <a:xfrm>
+                <a:off x="778087" y="1938482"/>
+                <a:ext cx="682349" cy="1177043"/>
+              </a:xfrm>
+              <a:prstGeom prst="ellipse">
+                <a:avLst/>
+              </a:prstGeom>
+              <a:grpFill/>
+              <a:ln w="38100">
+                <a:solidFill>
+                  <a:schemeClr val="tx1"/>
+                </a:solidFill>
+              </a:ln>
+            </p:spPr>
+            <p:style>
+              <a:lnRef idx="2">
+                <a:schemeClr val="accent1">
+                  <a:shade val="50000"/>
+                </a:schemeClr>
+              </a:lnRef>
+              <a:fillRef idx="1">
+                <a:schemeClr val="accent1"/>
+              </a:fillRef>
+              <a:effectRef idx="0">
+                <a:schemeClr val="accent1"/>
+              </a:effectRef>
+              <a:fontRef idx="minor">
+                <a:schemeClr val="lt1"/>
+              </a:fontRef>
+            </p:style>
+            <p:txBody>
+              <a:bodyPr rtlCol="0" anchor="ctr"/>
+              <a:lstStyle/>
+              <a:p>
+                <a:pPr algn="ctr"/>
+                <a:endParaRPr lang="en-US"/>
+              </a:p>
+            </p:txBody>
+          </p:sp>
+          <p:sp>
+            <p:nvSpPr>
+              <p:cNvPr id="19" name="Oval 18"/>
+              <p:cNvSpPr/>
+              <p:nvPr/>
+            </p:nvSpPr>
+            <p:spPr>
+              <a:xfrm>
+                <a:off x="843330" y="1938482"/>
+                <a:ext cx="682349" cy="1177043"/>
+              </a:xfrm>
+              <a:prstGeom prst="ellipse">
+                <a:avLst/>
+              </a:prstGeom>
+              <a:grpFill/>
+              <a:ln w="38100">
+                <a:solidFill>
+                  <a:schemeClr val="tx1"/>
+                </a:solidFill>
+              </a:ln>
+            </p:spPr>
+            <p:style>
+              <a:lnRef idx="2">
+                <a:schemeClr val="accent1">
+                  <a:shade val="50000"/>
+                </a:schemeClr>
+              </a:lnRef>
+              <a:fillRef idx="1">
+                <a:schemeClr val="accent1"/>
+              </a:fillRef>
+              <a:effectRef idx="0">
+                <a:schemeClr val="accent1"/>
+              </a:effectRef>
+              <a:fontRef idx="minor">
+                <a:schemeClr val="lt1"/>
+              </a:fontRef>
+            </p:style>
+            <p:txBody>
+              <a:bodyPr rtlCol="0" anchor="ctr"/>
+              <a:lstStyle/>
+              <a:p>
+                <a:pPr algn="ctr"/>
+                <a:endParaRPr lang="en-US"/>
+              </a:p>
+            </p:txBody>
+          </p:sp>
+          <p:sp>
+            <p:nvSpPr>
+              <p:cNvPr id="20" name="Freeform 19"/>
+              <p:cNvSpPr/>
+              <p:nvPr/>
+            </p:nvSpPr>
+            <p:spPr>
+              <a:xfrm>
+                <a:off x="780236" y="393406"/>
+                <a:ext cx="272388" cy="2711302"/>
+              </a:xfrm>
+              <a:custGeom>
+                <a:avLst/>
+                <a:gdLst>
+                  <a:gd name="connsiteX0" fmla="*/ 0 w 350874"/>
+                  <a:gd name="connsiteY0" fmla="*/ 0 h 2732567"/>
+                  <a:gd name="connsiteX1" fmla="*/ 0 w 350874"/>
+                  <a:gd name="connsiteY1" fmla="*/ 2349795 h 2732567"/>
+                  <a:gd name="connsiteX2" fmla="*/ 350874 w 350874"/>
+                  <a:gd name="connsiteY2" fmla="*/ 2732567 h 2732567"/>
+                  <a:gd name="connsiteX0" fmla="*/ 0 w 350874"/>
+                  <a:gd name="connsiteY0" fmla="*/ 0 h 2732567"/>
+                  <a:gd name="connsiteX1" fmla="*/ 95693 w 350874"/>
+                  <a:gd name="connsiteY1" fmla="*/ 2349795 h 2732567"/>
+                  <a:gd name="connsiteX2" fmla="*/ 350874 w 350874"/>
+                  <a:gd name="connsiteY2" fmla="*/ 2732567 h 2732567"/>
+                  <a:gd name="connsiteX0" fmla="*/ 21265 w 255181"/>
+                  <a:gd name="connsiteY0" fmla="*/ 0 h 2732567"/>
+                  <a:gd name="connsiteX1" fmla="*/ 0 w 255181"/>
+                  <a:gd name="connsiteY1" fmla="*/ 2349795 h 2732567"/>
+                  <a:gd name="connsiteX2" fmla="*/ 255181 w 255181"/>
+                  <a:gd name="connsiteY2" fmla="*/ 2732567 h 2732567"/>
+                  <a:gd name="connsiteX0" fmla="*/ 53163 w 255181"/>
+                  <a:gd name="connsiteY0" fmla="*/ 0 h 2721934"/>
+                  <a:gd name="connsiteX1" fmla="*/ 0 w 255181"/>
+                  <a:gd name="connsiteY1" fmla="*/ 2339162 h 2721934"/>
+                  <a:gd name="connsiteX2" fmla="*/ 255181 w 255181"/>
+                  <a:gd name="connsiteY2" fmla="*/ 2721934 h 2721934"/>
+                  <a:gd name="connsiteX0" fmla="*/ 31898 w 255181"/>
+                  <a:gd name="connsiteY0" fmla="*/ 0 h 2721934"/>
+                  <a:gd name="connsiteX1" fmla="*/ 0 w 255181"/>
+                  <a:gd name="connsiteY1" fmla="*/ 2339162 h 2721934"/>
+                  <a:gd name="connsiteX2" fmla="*/ 255181 w 255181"/>
+                  <a:gd name="connsiteY2" fmla="*/ 2721934 h 2721934"/>
+                  <a:gd name="connsiteX0" fmla="*/ 21265 w 255181"/>
+                  <a:gd name="connsiteY0" fmla="*/ 0 h 2711302"/>
+                  <a:gd name="connsiteX1" fmla="*/ 0 w 255181"/>
+                  <a:gd name="connsiteY1" fmla="*/ 2328530 h 2711302"/>
+                  <a:gd name="connsiteX2" fmla="*/ 255181 w 255181"/>
+                  <a:gd name="connsiteY2" fmla="*/ 2711302 h 2711302"/>
+                  <a:gd name="connsiteX0" fmla="*/ 21265 w 255181"/>
+                  <a:gd name="connsiteY0" fmla="*/ 0 h 2711302"/>
+                  <a:gd name="connsiteX1" fmla="*/ 0 w 255181"/>
+                  <a:gd name="connsiteY1" fmla="*/ 2328530 h 2711302"/>
+                  <a:gd name="connsiteX2" fmla="*/ 255181 w 255181"/>
+                  <a:gd name="connsiteY2" fmla="*/ 2711302 h 2711302"/>
+                  <a:gd name="connsiteX0" fmla="*/ 21265 w 255181"/>
+                  <a:gd name="connsiteY0" fmla="*/ 0 h 2711302"/>
+                  <a:gd name="connsiteX1" fmla="*/ 0 w 255181"/>
+                  <a:gd name="connsiteY1" fmla="*/ 2328530 h 2711302"/>
+                  <a:gd name="connsiteX2" fmla="*/ 255181 w 255181"/>
+                  <a:gd name="connsiteY2" fmla="*/ 2711302 h 2711302"/>
+                  <a:gd name="connsiteX0" fmla="*/ 38472 w 272388"/>
+                  <a:gd name="connsiteY0" fmla="*/ 0 h 2711302"/>
+                  <a:gd name="connsiteX1" fmla="*/ 17207 w 272388"/>
+                  <a:gd name="connsiteY1" fmla="*/ 2328530 h 2711302"/>
+                  <a:gd name="connsiteX2" fmla="*/ 272388 w 272388"/>
+                  <a:gd name="connsiteY2" fmla="*/ 2711302 h 2711302"/>
+                </a:gdLst>
+                <a:ahLst/>
+                <a:cxnLst>
+                  <a:cxn ang="0">
+                    <a:pos x="connsiteX0" y="connsiteY0"/>
+                  </a:cxn>
+                  <a:cxn ang="0">
+                    <a:pos x="connsiteX1" y="connsiteY1"/>
+                  </a:cxn>
+                  <a:cxn ang="0">
+                    <a:pos x="connsiteX2" y="connsiteY2"/>
+                  </a:cxn>
+                </a:cxnLst>
+                <a:rect l="l" t="t" r="r" b="b"/>
+                <a:pathLst>
+                  <a:path w="272388" h="2711302">
+                    <a:moveTo>
+                      <a:pt x="38472" y="0"/>
+                    </a:moveTo>
+                    <a:cubicBezTo>
+                      <a:pt x="31384" y="776177"/>
+                      <a:pt x="-28868" y="2179674"/>
+                      <a:pt x="17207" y="2328530"/>
+                    </a:cubicBezTo>
+                    <a:cubicBezTo>
+                      <a:pt x="59737" y="2466754"/>
+                      <a:pt x="49104" y="2562446"/>
+                      <a:pt x="272388" y="2711302"/>
+                    </a:cubicBezTo>
+                  </a:path>
+                </a:pathLst>
+              </a:custGeom>
+              <a:noFill/>
+              <a:ln w="38100">
+                <a:solidFill>
+                  <a:schemeClr val="tx1"/>
+                </a:solidFill>
+              </a:ln>
+            </p:spPr>
+            <p:style>
+              <a:lnRef idx="2">
+                <a:schemeClr val="accent1">
+                  <a:shade val="50000"/>
+                </a:schemeClr>
+              </a:lnRef>
+              <a:fillRef idx="1">
+                <a:schemeClr val="accent1"/>
+              </a:fillRef>
+              <a:effectRef idx="0">
+                <a:schemeClr val="accent1"/>
+              </a:effectRef>
+              <a:fontRef idx="minor">
+                <a:schemeClr val="lt1"/>
+              </a:fontRef>
+            </p:style>
+            <p:txBody>
+              <a:bodyPr rtlCol="0" anchor="ctr"/>
+              <a:lstStyle/>
+              <a:p>
+                <a:pPr algn="ctr"/>
+                <a:endParaRPr lang="en-US"/>
+              </a:p>
+            </p:txBody>
+          </p:sp>
+          <p:sp>
+            <p:nvSpPr>
+              <p:cNvPr id="21" name="Oval 20"/>
+              <p:cNvSpPr/>
+              <p:nvPr/>
+            </p:nvSpPr>
+            <p:spPr>
+              <a:xfrm>
+                <a:off x="945602" y="1520082"/>
+                <a:ext cx="1311442" cy="2129589"/>
+              </a:xfrm>
+              <a:prstGeom prst="ellipse">
+                <a:avLst/>
+              </a:prstGeom>
+              <a:grpFill/>
+              <a:ln w="38100">
+                <a:solidFill>
+                  <a:schemeClr val="tx1"/>
+                </a:solidFill>
+              </a:ln>
+            </p:spPr>
+            <p:style>
+              <a:lnRef idx="2">
+                <a:schemeClr val="accent1">
+                  <a:shade val="50000"/>
+                </a:schemeClr>
+              </a:lnRef>
+              <a:fillRef idx="1">
+                <a:schemeClr val="accent1"/>
+              </a:fillRef>
+              <a:effectRef idx="0">
+                <a:schemeClr val="accent1"/>
+              </a:effectRef>
+              <a:fontRef idx="minor">
+                <a:schemeClr val="lt1"/>
+              </a:fontRef>
+            </p:style>
+            <p:txBody>
+              <a:bodyPr rtlCol="0" anchor="ctr"/>
+              <a:lstStyle/>
+              <a:p>
+                <a:pPr algn="ctr"/>
+                <a:endParaRPr lang="en-US"/>
+              </a:p>
+            </p:txBody>
+          </p:sp>
+          <p:sp>
+            <p:nvSpPr>
+              <p:cNvPr id="22" name="Oval 21"/>
+              <p:cNvSpPr/>
+              <p:nvPr/>
+            </p:nvSpPr>
+            <p:spPr>
+              <a:xfrm>
+                <a:off x="1073939" y="1520081"/>
+                <a:ext cx="1311442" cy="2129589"/>
+              </a:xfrm>
+              <a:prstGeom prst="ellipse">
+                <a:avLst/>
+              </a:prstGeom>
+              <a:grpFill/>
+              <a:ln w="38100">
+                <a:solidFill>
+                  <a:schemeClr val="tx1"/>
+                </a:solidFill>
+              </a:ln>
+            </p:spPr>
+            <p:style>
+              <a:lnRef idx="2">
+                <a:schemeClr val="accent1">
+                  <a:shade val="50000"/>
+                </a:schemeClr>
+              </a:lnRef>
+              <a:fillRef idx="1">
+                <a:schemeClr val="accent1"/>
+              </a:fillRef>
+              <a:effectRef idx="0">
+                <a:schemeClr val="accent1"/>
+              </a:effectRef>
+              <a:fontRef idx="minor">
+                <a:schemeClr val="lt1"/>
+              </a:fontRef>
+            </p:style>
+            <p:txBody>
+              <a:bodyPr rtlCol="0" anchor="ctr"/>
+              <a:lstStyle/>
+              <a:p>
+                <a:pPr algn="ctr"/>
+                <a:endParaRPr lang="en-US"/>
+              </a:p>
+            </p:txBody>
+          </p:sp>
+        </p:grpSp>
+        <p:grpSp>
+          <p:nvGrpSpPr>
+            <p:cNvPr id="6" name="Group 5"/>
+            <p:cNvGrpSpPr/>
+            <p:nvPr/>
+          </p:nvGrpSpPr>
+          <p:grpSpPr>
+            <a:xfrm>
+              <a:off x="4139660" y="447742"/>
+              <a:ext cx="2131200" cy="3230279"/>
+              <a:chOff x="4448004" y="421757"/>
+              <a:chExt cx="2131200" cy="3230279"/>
+            </a:xfrm>
+          </p:grpSpPr>
+          <p:grpSp>
+            <p:nvGrpSpPr>
+              <p:cNvPr id="7" name="Group 6"/>
+              <p:cNvGrpSpPr/>
+              <p:nvPr/>
+            </p:nvGrpSpPr>
+            <p:grpSpPr>
+              <a:xfrm>
+                <a:off x="4448004" y="1522447"/>
+                <a:ext cx="2131200" cy="2129589"/>
+                <a:chOff x="4735083" y="1470391"/>
+                <a:chExt cx="2131200" cy="2129589"/>
+              </a:xfrm>
+            </p:grpSpPr>
+            <p:sp>
+              <p:nvSpPr>
+                <p:cNvPr id="13" name="Oval 12"/>
+                <p:cNvSpPr/>
+                <p:nvPr/>
+              </p:nvSpPr>
+              <p:spPr>
+                <a:xfrm>
+                  <a:off x="4735083" y="1470391"/>
+                  <a:ext cx="2131200" cy="2129589"/>
+                </a:xfrm>
+                <a:prstGeom prst="ellipse">
+                  <a:avLst/>
+                </a:prstGeom>
+                <a:solidFill>
+                  <a:schemeClr val="bg1"/>
+                </a:solidFill>
+                <a:ln w="38100">
+                  <a:solidFill>
+                    <a:schemeClr val="tx1"/>
+                  </a:solidFill>
+                </a:ln>
+              </p:spPr>
+              <p:style>
+                <a:lnRef idx="2">
+                  <a:schemeClr val="accent1">
+                    <a:shade val="50000"/>
+                  </a:schemeClr>
+                </a:lnRef>
+                <a:fillRef idx="1">
+                  <a:schemeClr val="accent1"/>
+                </a:fillRef>
+                <a:effectRef idx="0">
+                  <a:schemeClr val="accent1"/>
+                </a:effectRef>
+                <a:fontRef idx="minor">
+                  <a:schemeClr val="lt1"/>
+                </a:fontRef>
+              </p:style>
+              <p:txBody>
+                <a:bodyPr rtlCol="0" anchor="ctr"/>
+                <a:lstStyle/>
+                <a:p>
+                  <a:pPr algn="ctr"/>
+                  <a:endParaRPr lang="en-US"/>
+                </a:p>
+              </p:txBody>
+            </p:sp>
+            <p:sp>
+              <p:nvSpPr>
+                <p:cNvPr id="14" name="Oval 13"/>
+                <p:cNvSpPr/>
+                <p:nvPr/>
+              </p:nvSpPr>
+              <p:spPr>
+                <a:xfrm>
+                  <a:off x="5260683" y="1966833"/>
+                  <a:ext cx="1080000" cy="1080000"/>
+                </a:xfrm>
+                <a:prstGeom prst="ellipse">
+                  <a:avLst/>
+                </a:prstGeom>
+                <a:solidFill>
+                  <a:schemeClr val="bg1"/>
+                </a:solidFill>
+                <a:ln w="38100">
+                  <a:solidFill>
+                    <a:schemeClr val="tx1"/>
+                  </a:solidFill>
+                </a:ln>
+              </p:spPr>
+              <p:style>
+                <a:lnRef idx="2">
+                  <a:schemeClr val="accent1">
+                    <a:shade val="50000"/>
+                  </a:schemeClr>
+                </a:lnRef>
+                <a:fillRef idx="1">
+                  <a:schemeClr val="accent1"/>
+                </a:fillRef>
+                <a:effectRef idx="0">
+                  <a:schemeClr val="accent1"/>
+                </a:effectRef>
+                <a:fontRef idx="minor">
+                  <a:schemeClr val="lt1"/>
+                </a:fontRef>
+              </p:style>
+              <p:txBody>
+                <a:bodyPr rtlCol="0" anchor="ctr"/>
+                <a:lstStyle/>
+                <a:p>
+                  <a:pPr algn="ctr"/>
+                  <a:endParaRPr lang="en-US"/>
+                </a:p>
+              </p:txBody>
+            </p:sp>
+          </p:grpSp>
+          <p:cxnSp>
+            <p:nvCxnSpPr>
+              <p:cNvPr id="8" name="Straight Arrow Connector 7"/>
+              <p:cNvCxnSpPr>
+                <a:endCxn id="17" idx="7"/>
+              </p:cNvCxnSpPr>
+              <p:nvPr/>
+            </p:nvCxnSpPr>
+            <p:spPr>
+              <a:xfrm flipV="1">
+                <a:off x="5507665" y="2177051"/>
+                <a:ext cx="387777" cy="378304"/>
+              </a:xfrm>
+              <a:prstGeom prst="straightConnector1">
+                <a:avLst/>
+              </a:prstGeom>
+              <a:ln w="38100">
+                <a:solidFill>
+                  <a:schemeClr val="tx1"/>
+                </a:solidFill>
+                <a:tailEnd type="triangle"/>
+              </a:ln>
+            </p:spPr>
+            <p:style>
+              <a:lnRef idx="1">
+                <a:schemeClr val="accent1"/>
+              </a:lnRef>
+              <a:fillRef idx="0">
+                <a:schemeClr val="accent1"/>
+              </a:fillRef>
+              <a:effectRef idx="0">
+                <a:schemeClr val="accent1"/>
+              </a:effectRef>
+              <a:fontRef idx="minor">
+                <a:schemeClr val="tx1"/>
+              </a:fontRef>
+            </p:style>
+          </p:cxnSp>
+          <p:cxnSp>
+            <p:nvCxnSpPr>
+              <p:cNvPr id="9" name="Straight Arrow Connector 8"/>
+              <p:cNvCxnSpPr/>
+              <p:nvPr/>
+            </p:nvCxnSpPr>
+            <p:spPr>
+              <a:xfrm>
+                <a:off x="5507665" y="2555354"/>
+                <a:ext cx="868677" cy="588522"/>
+              </a:xfrm>
+              <a:prstGeom prst="straightConnector1">
+                <a:avLst/>
+              </a:prstGeom>
+              <a:ln w="38100">
+                <a:solidFill>
+                  <a:schemeClr val="tx1"/>
+                </a:solidFill>
+                <a:tailEnd type="triangle"/>
+              </a:ln>
+            </p:spPr>
+            <p:style>
+              <a:lnRef idx="1">
+                <a:schemeClr val="accent1"/>
+              </a:lnRef>
+              <a:fillRef idx="0">
+                <a:schemeClr val="accent1"/>
+              </a:fillRef>
+              <a:effectRef idx="0">
+                <a:schemeClr val="accent1"/>
+              </a:effectRef>
+              <a:fontRef idx="minor">
+                <a:schemeClr val="tx1"/>
+              </a:fontRef>
+            </p:style>
+          </p:cxnSp>
+          <mc:AlternateContent xmlns:mc="http://schemas.openxmlformats.org/markup-compatibility/2006">
+            <mc:Choice xmlns:a14="http://schemas.microsoft.com/office/drawing/2010/main" Requires="a14">
+              <p:sp>
+                <p:nvSpPr>
+                  <p:cNvPr id="10" name="TextBox 9"/>
+                  <p:cNvSpPr txBox="1"/>
+                  <p:nvPr/>
+                </p:nvSpPr>
+                <p:spPr>
+                  <a:xfrm>
+                    <a:off x="5284539" y="2007548"/>
+                    <a:ext cx="735770" cy="307777"/>
+                  </a:xfrm>
+                  <a:prstGeom prst="rect">
+                    <a:avLst/>
+                  </a:prstGeom>
+                  <a:noFill/>
+                </p:spPr>
+                <p:txBody>
+                  <a:bodyPr wrap="square" lIns="0" tIns="0" rIns="0" bIns="0" rtlCol="0">
+                    <a:spAutoFit/>
+                  </a:bodyPr>
+                  <a:lstStyle/>
+                  <a:p>
+                    <a14:m>
+                      <m:oMathPara xmlns:m="http://schemas.openxmlformats.org/officeDocument/2006/math">
+                        <m:oMathParaPr>
+                          <m:jc m:val="centerGroup"/>
+                        </m:oMathParaPr>
+                        <m:oMath xmlns:m="http://schemas.openxmlformats.org/officeDocument/2006/math">
+                          <m:sSub>
+                            <m:sSubPr>
+                              <m:ctrlPr>
+                                <a:rPr lang="en-CA" sz="2000" b="0" i="1" smtClean="0">
+                                  <a:latin typeface="Cambria Math" charset="0"/>
+                                  <a:cs typeface="Arial" panose="020B0604020202020204" pitchFamily="34" charset="0"/>
+                                </a:rPr>
+                              </m:ctrlPr>
+                            </m:sSubPr>
+                            <m:e>
+                              <m:r>
+                                <a:rPr lang="en-CA" sz="2000" b="0" i="1" smtClean="0">
+                                  <a:latin typeface="Cambria Math" charset="0"/>
+                                  <a:cs typeface="Arial" panose="020B0604020202020204" pitchFamily="34" charset="0"/>
+                                </a:rPr>
+                                <m:t>𝑟</m:t>
+                              </m:r>
+                            </m:e>
+                            <m:sub>
+                              <m:r>
+                                <a:rPr lang="en-CA" sz="2000" b="0" i="1" smtClean="0">
+                                  <a:latin typeface="Cambria Math" charset="0"/>
+                                  <a:cs typeface="Arial" panose="020B0604020202020204" pitchFamily="34" charset="0"/>
+                                </a:rPr>
+                                <m:t>1</m:t>
+                              </m:r>
+                            </m:sub>
+                          </m:sSub>
+                        </m:oMath>
+                      </m:oMathPara>
+                    </a14:m>
+                    <a:endParaRPr lang="en-US" sz="2000" dirty="0" smtClean="0">
+                      <a:latin typeface="Arial" panose="020B0604020202020204" pitchFamily="34" charset="0"/>
+                      <a:cs typeface="Arial" panose="020B0604020202020204" pitchFamily="34" charset="0"/>
+                    </a:endParaRPr>
+                  </a:p>
+                </p:txBody>
+              </p:sp>
+            </mc:Choice>
+            <mc:Fallback>
+              <p:sp>
+                <p:nvSpPr>
+                  <p:cNvPr id="10" name="TextBox 9"/>
+                  <p:cNvSpPr txBox="1">
+                    <a:spLocks noRot="1" noChangeAspect="1" noMove="1" noResize="1" noEditPoints="1" noAdjustHandles="1" noChangeArrowheads="1" noChangeShapeType="1" noTextEdit="1"/>
+                  </p:cNvSpPr>
+                  <p:nvPr/>
+                </p:nvSpPr>
+                <p:spPr>
+                  <a:xfrm>
+                    <a:off x="5284539" y="2007548"/>
+                    <a:ext cx="735770" cy="307777"/>
+                  </a:xfrm>
+                  <a:prstGeom prst="rect">
+                    <a:avLst/>
+                  </a:prstGeom>
+                  <a:blipFill rotWithShape="0">
+                    <a:blip r:embed="rId2"/>
+                    <a:stretch>
+                      <a:fillRect b="-20000"/>
+                    </a:stretch>
+                  </a:blipFill>
+                </p:spPr>
+                <p:txBody>
+                  <a:bodyPr/>
+                  <a:lstStyle/>
+                  <a:p>
+                    <a:r>
+                      <a:rPr lang="en-US">
+                        <a:noFill/>
+                      </a:rPr>
+                      <a:t> </a:t>
+                    </a:r>
+                  </a:p>
+                </p:txBody>
+              </p:sp>
+            </mc:Fallback>
+          </mc:AlternateContent>
+          <mc:AlternateContent xmlns:mc="http://schemas.openxmlformats.org/markup-compatibility/2006">
+            <mc:Choice xmlns:a14="http://schemas.microsoft.com/office/drawing/2010/main" Requires="a14">
+              <p:sp>
+                <p:nvSpPr>
+                  <p:cNvPr id="11" name="TextBox 10"/>
+                  <p:cNvSpPr txBox="1"/>
+                  <p:nvPr/>
+                </p:nvSpPr>
+                <p:spPr>
+                  <a:xfrm>
+                    <a:off x="5685719" y="2945001"/>
+                    <a:ext cx="735770" cy="307777"/>
+                  </a:xfrm>
+                  <a:prstGeom prst="rect">
+                    <a:avLst/>
+                  </a:prstGeom>
+                  <a:noFill/>
+                </p:spPr>
+                <p:txBody>
+                  <a:bodyPr wrap="square" lIns="0" tIns="0" rIns="0" bIns="0" rtlCol="0">
+                    <a:spAutoFit/>
+                  </a:bodyPr>
+                  <a:lstStyle/>
+                  <a:p>
+                    <a14:m>
+                      <m:oMathPara xmlns:m="http://schemas.openxmlformats.org/officeDocument/2006/math">
+                        <m:oMathParaPr>
+                          <m:jc m:val="centerGroup"/>
+                        </m:oMathParaPr>
+                        <m:oMath xmlns:m="http://schemas.openxmlformats.org/officeDocument/2006/math">
+                          <m:sSub>
+                            <m:sSubPr>
+                              <m:ctrlPr>
+                                <a:rPr lang="en-CA" sz="2000" b="0" i="1" smtClean="0">
+                                  <a:latin typeface="Cambria Math" charset="0"/>
+                                  <a:cs typeface="Arial" panose="020B0604020202020204" pitchFamily="34" charset="0"/>
+                                </a:rPr>
+                              </m:ctrlPr>
+                            </m:sSubPr>
+                            <m:e>
+                              <m:r>
+                                <a:rPr lang="en-CA" sz="2000" b="0" i="1" smtClean="0">
+                                  <a:latin typeface="Cambria Math" charset="0"/>
+                                  <a:cs typeface="Arial" panose="020B0604020202020204" pitchFamily="34" charset="0"/>
+                                </a:rPr>
+                                <m:t>𝑟</m:t>
+                              </m:r>
+                            </m:e>
+                            <m:sub>
+                              <m:r>
+                                <a:rPr lang="en-CA" sz="2000" b="0" i="1" smtClean="0">
+                                  <a:latin typeface="Cambria Math" charset="0"/>
+                                  <a:cs typeface="Arial" panose="020B0604020202020204" pitchFamily="34" charset="0"/>
+                                </a:rPr>
+                                <m:t>2</m:t>
+                              </m:r>
+                            </m:sub>
+                          </m:sSub>
+                        </m:oMath>
+                      </m:oMathPara>
+                    </a14:m>
+                    <a:endParaRPr lang="en-US" sz="2000" dirty="0" smtClean="0">
+                      <a:latin typeface="Arial" panose="020B0604020202020204" pitchFamily="34" charset="0"/>
+                      <a:cs typeface="Arial" panose="020B0604020202020204" pitchFamily="34" charset="0"/>
+                    </a:endParaRPr>
+                  </a:p>
+                </p:txBody>
+              </p:sp>
+            </mc:Choice>
+            <mc:Fallback>
+              <p:sp>
+                <p:nvSpPr>
+                  <p:cNvPr id="11" name="TextBox 10"/>
+                  <p:cNvSpPr txBox="1">
+                    <a:spLocks noRot="1" noChangeAspect="1" noMove="1" noResize="1" noEditPoints="1" noAdjustHandles="1" noChangeArrowheads="1" noChangeShapeType="1" noTextEdit="1"/>
+                  </p:cNvSpPr>
+                  <p:nvPr/>
+                </p:nvSpPr>
+                <p:spPr>
+                  <a:xfrm>
+                    <a:off x="5685719" y="2945001"/>
+                    <a:ext cx="735770" cy="307777"/>
+                  </a:xfrm>
+                  <a:prstGeom prst="rect">
+                    <a:avLst/>
+                  </a:prstGeom>
+                  <a:blipFill rotWithShape="0">
+                    <a:blip r:embed="rId3"/>
+                    <a:stretch>
+                      <a:fillRect b="-19608"/>
+                    </a:stretch>
+                  </a:blipFill>
+                </p:spPr>
+                <p:txBody>
+                  <a:bodyPr/>
+                  <a:lstStyle/>
+                  <a:p>
+                    <a:r>
+                      <a:rPr lang="en-US">
+                        <a:noFill/>
+                      </a:rPr>
+                      <a:t> </a:t>
+                    </a:r>
+                  </a:p>
+                </p:txBody>
+              </p:sp>
+            </mc:Fallback>
+          </mc:AlternateContent>
+          <p:cxnSp>
+            <p:nvCxnSpPr>
+              <p:cNvPr id="12" name="Straight Connector 11"/>
+              <p:cNvCxnSpPr>
+                <a:stCxn id="17" idx="2"/>
+              </p:cNvCxnSpPr>
+              <p:nvPr/>
+            </p:nvCxnSpPr>
+            <p:spPr>
+              <a:xfrm flipV="1">
+                <a:off x="4973604" y="421757"/>
+                <a:ext cx="0" cy="2137132"/>
+              </a:xfrm>
+              <a:prstGeom prst="line">
+                <a:avLst/>
+              </a:prstGeom>
+              <a:ln w="38100">
+                <a:solidFill>
+                  <a:schemeClr val="tx1"/>
+                </a:solidFill>
+              </a:ln>
+            </p:spPr>
+            <p:style>
+              <a:lnRef idx="1">
+                <a:schemeClr val="accent1"/>
+              </a:lnRef>
+              <a:fillRef idx="0">
+                <a:schemeClr val="accent1"/>
+              </a:fillRef>
+              <a:effectRef idx="0">
+                <a:schemeClr val="accent1"/>
+              </a:effectRef>
+              <a:fontRef idx="minor">
+                <a:schemeClr val="tx1"/>
+              </a:fontRef>
+            </p:style>
+          </p:cxnSp>
+        </p:grpSp>
+      </p:grpSp>
+      <p:grpSp>
+        <p:nvGrpSpPr>
+          <p:cNvPr id="23" name="Group 22"/>
+          <p:cNvGrpSpPr/>
+          <p:nvPr/>
+        </p:nvGrpSpPr>
+        <p:grpSpPr>
+          <a:xfrm>
+            <a:off x="8465505" y="542259"/>
+            <a:ext cx="2131200" cy="4141933"/>
+            <a:chOff x="8624994" y="542260"/>
+            <a:chExt cx="2131200" cy="4141933"/>
+          </a:xfrm>
+        </p:grpSpPr>
+        <p:sp>
+          <p:nvSpPr>
+            <p:cNvPr id="24" name="Oval 23"/>
+            <p:cNvSpPr/>
+            <p:nvPr/>
+          </p:nvSpPr>
+          <p:spPr>
+            <a:xfrm>
+              <a:off x="8624994" y="1548432"/>
+              <a:ext cx="2131200" cy="2129589"/>
+            </a:xfrm>
+            <a:prstGeom prst="ellipse">
+              <a:avLst/>
+            </a:prstGeom>
+            <a:solidFill>
+              <a:schemeClr val="bg1"/>
+            </a:solidFill>
+            <a:ln w="38100">
+              <a:solidFill>
+                <a:schemeClr val="tx1"/>
+              </a:solidFill>
+            </a:ln>
+          </p:spPr>
+          <p:style>
+            <a:lnRef idx="2">
+              <a:schemeClr val="accent1">
+                <a:shade val="50000"/>
+              </a:schemeClr>
+            </a:lnRef>
+            <a:fillRef idx="1">
+              <a:schemeClr val="accent1"/>
+            </a:fillRef>
+            <a:effectRef idx="0">
+              <a:schemeClr val="accent1"/>
+            </a:effectRef>
+            <a:fontRef idx="minor">
+              <a:schemeClr val="lt1"/>
+            </a:fontRef>
+          </p:style>
+          <p:txBody>
+            <a:bodyPr rtlCol="0" anchor="ctr"/>
+            <a:lstStyle/>
+            <a:p>
+              <a:pPr algn="ctr"/>
+              <a:endParaRPr lang="en-US"/>
+            </a:p>
+          </p:txBody>
+        </p:sp>
+        <p:sp>
+          <p:nvSpPr>
+            <p:cNvPr id="25" name="Oval 24"/>
+            <p:cNvSpPr/>
+            <p:nvPr/>
+          </p:nvSpPr>
+          <p:spPr>
+            <a:xfrm>
+              <a:off x="9150594" y="2044874"/>
+              <a:ext cx="1080000" cy="1080000"/>
+            </a:xfrm>
+            <a:prstGeom prst="ellipse">
+              <a:avLst/>
+            </a:prstGeom>
+            <a:solidFill>
+              <a:schemeClr val="bg1"/>
+            </a:solidFill>
+            <a:ln w="38100">
+              <a:solidFill>
+                <a:schemeClr val="tx1"/>
+              </a:solidFill>
+            </a:ln>
+          </p:spPr>
+          <p:style>
+            <a:lnRef idx="2">
+              <a:schemeClr val="accent1">
+                <a:shade val="50000"/>
+              </a:schemeClr>
+            </a:lnRef>
+            <a:fillRef idx="1">
+              <a:schemeClr val="accent1"/>
+            </a:fillRef>
+            <a:effectRef idx="0">
+              <a:schemeClr val="accent1"/>
+            </a:effectRef>
+            <a:fontRef idx="minor">
+              <a:schemeClr val="lt1"/>
+            </a:fontRef>
+          </p:style>
+          <p:txBody>
+            <a:bodyPr rtlCol="0" anchor="ctr"/>
+            <a:lstStyle/>
+            <a:p>
+              <a:pPr algn="ctr"/>
+              <a:endParaRPr lang="en-US"/>
+            </a:p>
+          </p:txBody>
+        </p:sp>
+        <p:cxnSp>
+          <p:nvCxnSpPr>
+            <p:cNvPr id="26" name="Straight Arrow Connector 25"/>
+            <p:cNvCxnSpPr/>
+            <p:nvPr/>
+          </p:nvCxnSpPr>
+          <p:spPr>
+            <a:xfrm flipV="1">
+              <a:off x="9150594" y="542260"/>
+              <a:ext cx="0" cy="2042614"/>
+            </a:xfrm>
+            <a:prstGeom prst="straightConnector1">
+              <a:avLst/>
+            </a:prstGeom>
+            <a:ln w="38100">
+              <a:solidFill>
+                <a:schemeClr val="tx1"/>
+              </a:solidFill>
+              <a:tailEnd type="triangle"/>
+            </a:ln>
+          </p:spPr>
+          <p:style>
+            <a:lnRef idx="1">
+              <a:schemeClr val="accent1"/>
+            </a:lnRef>
+            <a:fillRef idx="0">
+              <a:schemeClr val="accent1"/>
+            </a:fillRef>
+            <a:effectRef idx="0">
+              <a:schemeClr val="accent1"/>
+            </a:effectRef>
+            <a:fontRef idx="minor">
+              <a:schemeClr val="tx1"/>
+            </a:fontRef>
+          </p:style>
+        </p:cxnSp>
+        <p:cxnSp>
+          <p:nvCxnSpPr>
+            <p:cNvPr id="27" name="Straight Arrow Connector 26"/>
+            <p:cNvCxnSpPr/>
+            <p:nvPr/>
+          </p:nvCxnSpPr>
+          <p:spPr>
+            <a:xfrm>
+              <a:off x="9686261" y="2581339"/>
+              <a:ext cx="0" cy="2102854"/>
+            </a:xfrm>
+            <a:prstGeom prst="straightConnector1">
+              <a:avLst/>
+            </a:prstGeom>
+            <a:ln w="38100">
+              <a:solidFill>
+                <a:schemeClr val="tx1"/>
+              </a:solidFill>
+              <a:tailEnd type="triangle"/>
+            </a:ln>
+          </p:spPr>
+          <p:style>
+            <a:lnRef idx="1">
+              <a:schemeClr val="accent1"/>
+            </a:lnRef>
+            <a:fillRef idx="0">
+              <a:schemeClr val="accent1"/>
+            </a:fillRef>
+            <a:effectRef idx="0">
+              <a:schemeClr val="accent1"/>
+            </a:effectRef>
+            <a:fontRef idx="minor">
+              <a:schemeClr val="tx1"/>
+            </a:fontRef>
+          </p:style>
+        </p:cxnSp>
+        <mc:AlternateContent xmlns:mc="http://schemas.openxmlformats.org/markup-compatibility/2006">
+          <mc:Choice xmlns:a14="http://schemas.microsoft.com/office/drawing/2010/main" Requires="a14">
+            <p:sp>
+              <p:nvSpPr>
+                <p:cNvPr id="28" name="TextBox 27"/>
+                <p:cNvSpPr txBox="1"/>
+                <p:nvPr/>
+              </p:nvSpPr>
+              <p:spPr>
+                <a:xfrm>
+                  <a:off x="9806495" y="4028330"/>
+                  <a:ext cx="303865" cy="377219"/>
+                </a:xfrm>
+                <a:prstGeom prst="rect">
+                  <a:avLst/>
+                </a:prstGeom>
+                <a:noFill/>
+              </p:spPr>
+              <p:txBody>
+                <a:bodyPr wrap="none" lIns="0" tIns="0" rIns="0" bIns="0" rtlCol="0">
+                  <a:spAutoFit/>
+                </a:bodyPr>
+                <a:lstStyle/>
+                <a:p>
+                  <a14:m>
+                    <m:oMathPara xmlns:m="http://schemas.openxmlformats.org/officeDocument/2006/math">
+                      <m:oMathParaPr>
+                        <m:jc m:val="centerGroup"/>
+                      </m:oMathParaPr>
+                      <m:oMath xmlns:m="http://schemas.openxmlformats.org/officeDocument/2006/math">
+                        <m:sSub>
+                          <m:sSubPr>
+                            <m:ctrlPr>
+                              <a:rPr lang="en-CA" sz="2000" b="0" i="1" smtClean="0">
+                                <a:latin typeface="Cambria Math" charset="0"/>
+                                <a:cs typeface="Arial" panose="020B0604020202020204" pitchFamily="34" charset="0"/>
+                              </a:rPr>
+                            </m:ctrlPr>
+                          </m:sSubPr>
+                          <m:e>
+                            <m:acc>
+                              <m:accPr>
+                                <m:chr m:val="⃗"/>
+                                <m:ctrlPr>
+                                  <a:rPr lang="en-US" sz="2000" i="1" smtClean="0">
+                                    <a:latin typeface="Cambria Math" charset="0"/>
+                                    <a:cs typeface="Arial" panose="020B0604020202020204" pitchFamily="34" charset="0"/>
+                                  </a:rPr>
+                                </m:ctrlPr>
+                              </m:accPr>
+                              <m:e>
+                                <m:r>
+                                  <a:rPr lang="en-CA" sz="2000" b="0" i="1" smtClean="0">
+                                    <a:latin typeface="Cambria Math" charset="0"/>
+                                    <a:cs typeface="Arial" panose="020B0604020202020204" pitchFamily="34" charset="0"/>
+                                  </a:rPr>
+                                  <m:t>𝐹</m:t>
+                                </m:r>
+                              </m:e>
+                            </m:acc>
+                          </m:e>
+                          <m:sub>
+                            <m:r>
+                              <a:rPr lang="en-CA" sz="2000" b="0" i="1" smtClean="0">
+                                <a:latin typeface="Cambria Math" charset="0"/>
+                                <a:cs typeface="Arial" panose="020B0604020202020204" pitchFamily="34" charset="0"/>
+                              </a:rPr>
+                              <m:t>𝑔</m:t>
+                            </m:r>
+                          </m:sub>
+                        </m:sSub>
+                      </m:oMath>
+                    </m:oMathPara>
+                  </a14:m>
+                  <a:endParaRPr lang="en-US" sz="2000" dirty="0" smtClean="0">
+                    <a:latin typeface="Arial" panose="020B0604020202020204" pitchFamily="34" charset="0"/>
+                    <a:cs typeface="Arial" panose="020B0604020202020204" pitchFamily="34" charset="0"/>
+                  </a:endParaRPr>
+                </a:p>
+              </p:txBody>
+            </p:sp>
+          </mc:Choice>
+          <mc:Fallback>
+            <p:sp>
+              <p:nvSpPr>
+                <p:cNvPr id="28" name="TextBox 27"/>
+                <p:cNvSpPr txBox="1">
+                  <a:spLocks noRot="1" noChangeAspect="1" noMove="1" noResize="1" noEditPoints="1" noAdjustHandles="1" noChangeArrowheads="1" noChangeShapeType="1" noTextEdit="1"/>
+                </p:cNvSpPr>
+                <p:nvPr/>
+              </p:nvSpPr>
+              <p:spPr>
+                <a:xfrm>
+                  <a:off x="9806495" y="4028330"/>
+                  <a:ext cx="303865" cy="377219"/>
+                </a:xfrm>
+                <a:prstGeom prst="rect">
+                  <a:avLst/>
+                </a:prstGeom>
+                <a:blipFill rotWithShape="0">
+                  <a:blip r:embed="rId4"/>
+                  <a:stretch>
+                    <a:fillRect l="-18367" t="-32258" r="-73469" b="-19355"/>
+                  </a:stretch>
+                </a:blipFill>
+              </p:spPr>
+              <p:txBody>
+                <a:bodyPr/>
+                <a:lstStyle/>
+                <a:p>
+                  <a:r>
+                    <a:rPr lang="en-US">
+                      <a:noFill/>
+                    </a:rPr>
+                    <a:t> </a:t>
+                  </a:r>
+                </a:p>
+              </p:txBody>
+            </p:sp>
+          </mc:Fallback>
+        </mc:AlternateContent>
+        <mc:AlternateContent xmlns:mc="http://schemas.openxmlformats.org/markup-compatibility/2006">
+          <mc:Choice xmlns:a14="http://schemas.microsoft.com/office/drawing/2010/main" Requires="a14">
+            <p:sp>
+              <p:nvSpPr>
+                <p:cNvPr id="29" name="TextBox 28"/>
+                <p:cNvSpPr txBox="1"/>
+                <p:nvPr/>
+              </p:nvSpPr>
+              <p:spPr>
+                <a:xfrm>
+                  <a:off x="8822162" y="1044234"/>
+                  <a:ext cx="228460" cy="307777"/>
+                </a:xfrm>
+                <a:prstGeom prst="rect">
+                  <a:avLst/>
+                </a:prstGeom>
+                <a:noFill/>
+              </p:spPr>
+              <p:txBody>
+                <a:bodyPr wrap="none" lIns="0" tIns="0" rIns="0" bIns="0" rtlCol="0">
+                  <a:spAutoFit/>
+                </a:bodyPr>
+                <a:lstStyle/>
+                <a:p>
+                  <a14:m>
+                    <m:oMathPara xmlns:m="http://schemas.openxmlformats.org/officeDocument/2006/math">
+                      <m:oMathParaPr>
+                        <m:jc m:val="centerGroup"/>
+                      </m:oMathParaPr>
+                      <m:oMath xmlns:m="http://schemas.openxmlformats.org/officeDocument/2006/math">
+                        <m:r>
+                          <a:rPr lang="en-CA" sz="2000" b="0" i="1" smtClean="0">
+                            <a:latin typeface="Cambria Math" charset="0"/>
+                            <a:cs typeface="Arial" panose="020B0604020202020204" pitchFamily="34" charset="0"/>
+                          </a:rPr>
+                          <m:t>𝑇</m:t>
+                        </m:r>
+                      </m:oMath>
+                    </m:oMathPara>
+                  </a14:m>
+                  <a:endParaRPr lang="en-US" sz="2000" dirty="0" smtClean="0">
+                    <a:latin typeface="Arial" panose="020B0604020202020204" pitchFamily="34" charset="0"/>
+                    <a:cs typeface="Arial" panose="020B0604020202020204" pitchFamily="34" charset="0"/>
+                  </a:endParaRPr>
+                </a:p>
+              </p:txBody>
+            </p:sp>
+          </mc:Choice>
+          <mc:Fallback>
+            <p:sp>
+              <p:nvSpPr>
+                <p:cNvPr id="29" name="TextBox 28"/>
+                <p:cNvSpPr txBox="1">
+                  <a:spLocks noRot="1" noChangeAspect="1" noMove="1" noResize="1" noEditPoints="1" noAdjustHandles="1" noChangeArrowheads="1" noChangeShapeType="1" noTextEdit="1"/>
+                </p:cNvSpPr>
+                <p:nvPr/>
+              </p:nvSpPr>
+              <p:spPr>
+                <a:xfrm>
+                  <a:off x="8822162" y="1044234"/>
+                  <a:ext cx="228460" cy="307777"/>
+                </a:xfrm>
+                <a:prstGeom prst="rect">
+                  <a:avLst/>
+                </a:prstGeom>
+                <a:blipFill rotWithShape="0">
+                  <a:blip r:embed="rId5"/>
+                  <a:stretch>
+                    <a:fillRect l="-21053" r="-21053" b="-9804"/>
+                  </a:stretch>
+                </a:blipFill>
+              </p:spPr>
+              <p:txBody>
+                <a:bodyPr/>
+                <a:lstStyle/>
+                <a:p>
+                  <a:r>
+                    <a:rPr lang="en-US">
+                      <a:noFill/>
+                    </a:rPr>
+                    <a:t> </a:t>
+                  </a:r>
+                </a:p>
+              </p:txBody>
+            </p:sp>
+          </mc:Fallback>
+        </mc:AlternateContent>
+      </p:grpSp>
+    </p:spTree>
+    <p:extLst>
+      <p:ext uri="{BB962C8B-B14F-4D97-AF65-F5344CB8AC3E}">
+        <p14:creationId xmlns:p14="http://schemas.microsoft.com/office/powerpoint/2010/main" val="552006572"/>
       </p:ext>
     </p:extLst>
   </p:cSld>

</xml_diff>